<commit_message>
Update liner regression ppt
Update liner regression ppt
</commit_message>
<xml_diff>
--- a/chapter.2/ppt/Liner regression.pptx
+++ b/chapter.2/ppt/Liner regression.pptx
@@ -6,7 +6,7 @@
     <p:sldMasterId id="2147483650" r:id="rId2"/>
   </p:sldMasterIdLst>
   <p:notesMasterIdLst>
-    <p:notesMasterId r:id="rId19"/>
+    <p:notesMasterId r:id="rId20"/>
   </p:notesMasterIdLst>
   <p:sldIdLst>
     <p:sldId id="258" r:id="rId3"/>
@@ -17,14 +17,15 @@
     <p:sldId id="301" r:id="rId8"/>
     <p:sldId id="302" r:id="rId9"/>
     <p:sldId id="307" r:id="rId10"/>
-    <p:sldId id="303" r:id="rId11"/>
-    <p:sldId id="304" r:id="rId12"/>
-    <p:sldId id="305" r:id="rId13"/>
-    <p:sldId id="306" r:id="rId14"/>
-    <p:sldId id="308" r:id="rId15"/>
-    <p:sldId id="296" r:id="rId16"/>
-    <p:sldId id="309" r:id="rId17"/>
-    <p:sldId id="294" r:id="rId18"/>
+    <p:sldId id="310" r:id="rId11"/>
+    <p:sldId id="303" r:id="rId12"/>
+    <p:sldId id="304" r:id="rId13"/>
+    <p:sldId id="305" r:id="rId14"/>
+    <p:sldId id="306" r:id="rId15"/>
+    <p:sldId id="308" r:id="rId16"/>
+    <p:sldId id="296" r:id="rId17"/>
+    <p:sldId id="309" r:id="rId18"/>
+    <p:sldId id="294" r:id="rId19"/>
   </p:sldIdLst>
   <p:sldSz cx="9144000" cy="6858000" type="screen4x3"/>
   <p:notesSz cx="6858000" cy="9144000"/>
@@ -7239,7 +7240,7 @@
     </p:spTree>
     <p:extLst>
       <p:ext uri="{BB962C8B-B14F-4D97-AF65-F5344CB8AC3E}">
-        <p14:creationId xmlns:p14="http://schemas.microsoft.com/office/powerpoint/2010/main" val="2562062021"/>
+        <p14:creationId xmlns:p14="http://schemas.microsoft.com/office/powerpoint/2010/main" val="4248633763"/>
       </p:ext>
     </p:extLst>
   </p:cSld>
@@ -7323,7 +7324,7 @@
     </p:spTree>
     <p:extLst>
       <p:ext uri="{BB962C8B-B14F-4D97-AF65-F5344CB8AC3E}">
-        <p14:creationId xmlns:p14="http://schemas.microsoft.com/office/powerpoint/2010/main" val="4260479858"/>
+        <p14:creationId xmlns:p14="http://schemas.microsoft.com/office/powerpoint/2010/main" val="2562062021"/>
       </p:ext>
     </p:extLst>
   </p:cSld>
@@ -7407,7 +7408,7 @@
     </p:spTree>
     <p:extLst>
       <p:ext uri="{BB962C8B-B14F-4D97-AF65-F5344CB8AC3E}">
-        <p14:creationId xmlns:p14="http://schemas.microsoft.com/office/powerpoint/2010/main" val="765072184"/>
+        <p14:creationId xmlns:p14="http://schemas.microsoft.com/office/powerpoint/2010/main" val="4260479858"/>
       </p:ext>
     </p:extLst>
   </p:cSld>
@@ -7461,6 +7462,90 @@
           <a:bodyPr/>
           <a:lstStyle/>
           <a:p>
+            <a:endParaRPr lang="en-US" dirty="0"/>
+          </a:p>
+        </p:txBody>
+      </p:sp>
+      <p:sp>
+        <p:nvSpPr>
+          <p:cNvPr id="4" name="Slide Number Placeholder 3"/>
+          <p:cNvSpPr>
+            <a:spLocks noGrp="1"/>
+          </p:cNvSpPr>
+          <p:nvPr>
+            <p:ph type="sldNum" sz="quarter" idx="10"/>
+          </p:nvPr>
+        </p:nvSpPr>
+        <p:spPr/>
+        <p:txBody>
+          <a:bodyPr/>
+          <a:lstStyle/>
+          <a:p>
+            <a:fld id="{0B76D41F-532B-47A5-ADDC-B3CCCB6F95B2}" type="slidenum">
+              <a:rPr lang="en-US" smtClean="0"/>
+              <a:t>14</a:t>
+            </a:fld>
+            <a:endParaRPr lang="en-US"/>
+          </a:p>
+        </p:txBody>
+      </p:sp>
+    </p:spTree>
+    <p:extLst>
+      <p:ext uri="{BB962C8B-B14F-4D97-AF65-F5344CB8AC3E}">
+        <p14:creationId xmlns:p14="http://schemas.microsoft.com/office/powerpoint/2010/main" val="765072184"/>
+      </p:ext>
+    </p:extLst>
+  </p:cSld>
+  <p:clrMapOvr>
+    <a:masterClrMapping/>
+  </p:clrMapOvr>
+</p:notes>
+</file>
+
+<file path=ppt/notesSlides/notesSlide14.xml><?xml version="1.0" encoding="utf-8"?>
+<p:notes xmlns:a="http://schemas.openxmlformats.org/drawingml/2006/main" xmlns:r="http://schemas.openxmlformats.org/officeDocument/2006/relationships" xmlns:p="http://schemas.openxmlformats.org/presentationml/2006/main">
+  <p:cSld>
+    <p:spTree>
+      <p:nvGrpSpPr>
+        <p:cNvPr id="1" name=""/>
+        <p:cNvGrpSpPr/>
+        <p:nvPr/>
+      </p:nvGrpSpPr>
+      <p:grpSpPr>
+        <a:xfrm>
+          <a:off x="0" y="0"/>
+          <a:ext cx="0" cy="0"/>
+          <a:chOff x="0" y="0"/>
+          <a:chExt cx="0" cy="0"/>
+        </a:xfrm>
+      </p:grpSpPr>
+      <p:sp>
+        <p:nvSpPr>
+          <p:cNvPr id="2" name="Slide Image Placeholder 1"/>
+          <p:cNvSpPr>
+            <a:spLocks noGrp="1" noRot="1" noChangeAspect="1"/>
+          </p:cNvSpPr>
+          <p:nvPr>
+            <p:ph type="sldImg"/>
+          </p:nvPr>
+        </p:nvSpPr>
+        <p:spPr/>
+      </p:sp>
+      <p:sp>
+        <p:nvSpPr>
+          <p:cNvPr id="3" name="Notes Placeholder 2"/>
+          <p:cNvSpPr>
+            <a:spLocks noGrp="1"/>
+          </p:cNvSpPr>
+          <p:nvPr>
+            <p:ph type="body" idx="1"/>
+          </p:nvPr>
+        </p:nvSpPr>
+        <p:spPr/>
+        <p:txBody>
+          <a:bodyPr/>
+          <a:lstStyle/>
+          <a:p>
             <a:pPr marL="0" marR="0" lvl="0" indent="0" algn="l" defTabSz="914400" rtl="0" eaLnBrk="1" fontAlgn="auto" latinLnBrk="0" hangingPunct="1">
               <a:lnSpc>
                 <a:spcPct val="100000"/>
@@ -7510,7 +7595,7 @@
           <a:p>
             <a:fld id="{0B76D41F-532B-47A5-ADDC-B3CCCB6F95B2}" type="slidenum">
               <a:rPr lang="en-US" smtClean="0"/>
-              <a:t>15</a:t>
+              <a:t>16</a:t>
             </a:fld>
             <a:endParaRPr lang="en-US"/>
           </a:p>
@@ -9114,7 +9199,7 @@
     </p:spTree>
     <p:extLst>
       <p:ext uri="{BB962C8B-B14F-4D97-AF65-F5344CB8AC3E}">
-        <p14:creationId xmlns:p14="http://schemas.microsoft.com/office/powerpoint/2010/main" val="3086218834"/>
+        <p14:creationId xmlns:p14="http://schemas.microsoft.com/office/powerpoint/2010/main" val="3274899505"/>
       </p:ext>
     </p:extLst>
   </p:cSld>
@@ -9198,7 +9283,7 @@
     </p:spTree>
     <p:extLst>
       <p:ext uri="{BB962C8B-B14F-4D97-AF65-F5344CB8AC3E}">
-        <p14:creationId xmlns:p14="http://schemas.microsoft.com/office/powerpoint/2010/main" val="4248633763"/>
+        <p14:creationId xmlns:p14="http://schemas.microsoft.com/office/powerpoint/2010/main" val="3086218834"/>
       </p:ext>
     </p:extLst>
   </p:cSld>
@@ -16807,6 +16892,284 @@
 </file>
 
 <file path=ppt/slides/slide10.xml><?xml version="1.0" encoding="utf-8"?>
+<p:sld xmlns:a="http://schemas.openxmlformats.org/drawingml/2006/main" xmlns:r="http://schemas.openxmlformats.org/officeDocument/2006/relationships" xmlns:p="http://schemas.openxmlformats.org/presentationml/2006/main">
+  <p:cSld>
+    <p:spTree>
+      <p:nvGrpSpPr>
+        <p:cNvPr id="1" name=""/>
+        <p:cNvGrpSpPr/>
+        <p:nvPr/>
+      </p:nvGrpSpPr>
+      <p:grpSpPr>
+        <a:xfrm>
+          <a:off x="0" y="0"/>
+          <a:ext cx="0" cy="0"/>
+          <a:chOff x="0" y="0"/>
+          <a:chExt cx="0" cy="0"/>
+        </a:xfrm>
+      </p:grpSpPr>
+      <p:sp>
+        <p:nvSpPr>
+          <p:cNvPr id="4098" name="TextBox 2">
+            <a:extLst>
+              <a:ext uri="{FF2B5EF4-FFF2-40B4-BE49-F238E27FC236}">
+                <a16:creationId xmlns:a16="http://schemas.microsoft.com/office/drawing/2014/main" id="{5552ED83-0001-4E47-A09B-F49C592A8E24}"/>
+              </a:ext>
+            </a:extLst>
+          </p:cNvPr>
+          <p:cNvSpPr txBox="1">
+            <a:spLocks noChangeArrowheads="1"/>
+          </p:cNvSpPr>
+          <p:nvPr/>
+        </p:nvSpPr>
+        <p:spPr bwMode="auto">
+          <a:xfrm>
+            <a:off x="179388" y="530225"/>
+            <a:ext cx="6913562" cy="830263"/>
+          </a:xfrm>
+          <a:prstGeom prst="rect">
+            <a:avLst/>
+          </a:prstGeom>
+          <a:noFill/>
+          <a:ln>
+            <a:noFill/>
+          </a:ln>
+          <a:extLst>
+            <a:ext uri="{909E8E84-426E-40DD-AFC4-6F175D3DCCD1}">
+              <a14:hiddenFill xmlns:a14="http://schemas.microsoft.com/office/drawing/2010/main">
+                <a:solidFill>
+                  <a:srgbClr val="FFFFFF"/>
+                </a:solidFill>
+              </a14:hiddenFill>
+            </a:ext>
+            <a:ext uri="{91240B29-F687-4F45-9708-019B960494DF}">
+              <a14:hiddenLine xmlns:a14="http://schemas.microsoft.com/office/drawing/2010/main" w="9525">
+                <a:solidFill>
+                  <a:srgbClr val="000000"/>
+                </a:solidFill>
+                <a:miter lim="800000"/>
+                <a:headEnd/>
+                <a:tailEnd/>
+              </a14:hiddenLine>
+            </a:ext>
+          </a:extLst>
+        </p:spPr>
+        <p:txBody>
+          <a:bodyPr>
+            <a:spAutoFit/>
+          </a:bodyPr>
+          <a:lstStyle>
+            <a:lvl1pPr eaLnBrk="0" hangingPunct="0">
+              <a:defRPr>
+                <a:solidFill>
+                  <a:schemeClr val="tx1"/>
+                </a:solidFill>
+                <a:latin typeface="Arial" panose="020B0604020202020204" pitchFamily="34" charset="0"/>
+                <a:ea typeface="宋体" panose="02010600030101010101" pitchFamily="2" charset="-122"/>
+              </a:defRPr>
+            </a:lvl1pPr>
+            <a:lvl2pPr marL="742950" indent="-285750" eaLnBrk="0" hangingPunct="0">
+              <a:defRPr>
+                <a:solidFill>
+                  <a:schemeClr val="tx1"/>
+                </a:solidFill>
+                <a:latin typeface="Arial" panose="020B0604020202020204" pitchFamily="34" charset="0"/>
+                <a:ea typeface="宋体" panose="02010600030101010101" pitchFamily="2" charset="-122"/>
+              </a:defRPr>
+            </a:lvl2pPr>
+            <a:lvl3pPr marL="1143000" indent="-228600" eaLnBrk="0" hangingPunct="0">
+              <a:defRPr>
+                <a:solidFill>
+                  <a:schemeClr val="tx1"/>
+                </a:solidFill>
+                <a:latin typeface="Arial" panose="020B0604020202020204" pitchFamily="34" charset="0"/>
+                <a:ea typeface="宋体" panose="02010600030101010101" pitchFamily="2" charset="-122"/>
+              </a:defRPr>
+            </a:lvl3pPr>
+            <a:lvl4pPr marL="1600200" indent="-228600" eaLnBrk="0" hangingPunct="0">
+              <a:defRPr>
+                <a:solidFill>
+                  <a:schemeClr val="tx1"/>
+                </a:solidFill>
+                <a:latin typeface="Arial" panose="020B0604020202020204" pitchFamily="34" charset="0"/>
+                <a:ea typeface="宋体" panose="02010600030101010101" pitchFamily="2" charset="-122"/>
+              </a:defRPr>
+            </a:lvl4pPr>
+            <a:lvl5pPr marL="2057400" indent="-228600" eaLnBrk="0" hangingPunct="0">
+              <a:defRPr>
+                <a:solidFill>
+                  <a:schemeClr val="tx1"/>
+                </a:solidFill>
+                <a:latin typeface="Arial" panose="020B0604020202020204" pitchFamily="34" charset="0"/>
+                <a:ea typeface="宋体" panose="02010600030101010101" pitchFamily="2" charset="-122"/>
+              </a:defRPr>
+            </a:lvl5pPr>
+            <a:lvl6pPr marL="2514600" indent="-228600" eaLnBrk="0" fontAlgn="base" hangingPunct="0">
+              <a:spcBef>
+                <a:spcPct val="0"/>
+              </a:spcBef>
+              <a:spcAft>
+                <a:spcPct val="0"/>
+              </a:spcAft>
+              <a:defRPr>
+                <a:solidFill>
+                  <a:schemeClr val="tx1"/>
+                </a:solidFill>
+                <a:latin typeface="Arial" panose="020B0604020202020204" pitchFamily="34" charset="0"/>
+                <a:ea typeface="宋体" panose="02010600030101010101" pitchFamily="2" charset="-122"/>
+              </a:defRPr>
+            </a:lvl6pPr>
+            <a:lvl7pPr marL="2971800" indent="-228600" eaLnBrk="0" fontAlgn="base" hangingPunct="0">
+              <a:spcBef>
+                <a:spcPct val="0"/>
+              </a:spcBef>
+              <a:spcAft>
+                <a:spcPct val="0"/>
+              </a:spcAft>
+              <a:defRPr>
+                <a:solidFill>
+                  <a:schemeClr val="tx1"/>
+                </a:solidFill>
+                <a:latin typeface="Arial" panose="020B0604020202020204" pitchFamily="34" charset="0"/>
+                <a:ea typeface="宋体" panose="02010600030101010101" pitchFamily="2" charset="-122"/>
+              </a:defRPr>
+            </a:lvl7pPr>
+            <a:lvl8pPr marL="3429000" indent="-228600" eaLnBrk="0" fontAlgn="base" hangingPunct="0">
+              <a:spcBef>
+                <a:spcPct val="0"/>
+              </a:spcBef>
+              <a:spcAft>
+                <a:spcPct val="0"/>
+              </a:spcAft>
+              <a:defRPr>
+                <a:solidFill>
+                  <a:schemeClr val="tx1"/>
+                </a:solidFill>
+                <a:latin typeface="Arial" panose="020B0604020202020204" pitchFamily="34" charset="0"/>
+                <a:ea typeface="宋体" panose="02010600030101010101" pitchFamily="2" charset="-122"/>
+              </a:defRPr>
+            </a:lvl8pPr>
+            <a:lvl9pPr marL="3886200" indent="-228600" eaLnBrk="0" fontAlgn="base" hangingPunct="0">
+              <a:spcBef>
+                <a:spcPct val="0"/>
+              </a:spcBef>
+              <a:spcAft>
+                <a:spcPct val="0"/>
+              </a:spcAft>
+              <a:defRPr>
+                <a:solidFill>
+                  <a:schemeClr val="tx1"/>
+                </a:solidFill>
+                <a:latin typeface="Arial" panose="020B0604020202020204" pitchFamily="34" charset="0"/>
+                <a:ea typeface="宋体" panose="02010600030101010101" pitchFamily="2" charset="-122"/>
+              </a:defRPr>
+            </a:lvl9pPr>
+          </a:lstStyle>
+          <a:p>
+            <a:pPr eaLnBrk="1" hangingPunct="1"/>
+            <a:r>
+              <a:rPr lang="zh-CN" altLang="en-US" sz="4800" dirty="0">
+                <a:solidFill>
+                  <a:schemeClr val="bg1"/>
+                </a:solidFill>
+                <a:latin typeface="微软雅黑" panose="020B0503020204020204" pitchFamily="34" charset="-122"/>
+                <a:ea typeface="微软雅黑" panose="020B0503020204020204" pitchFamily="34" charset="-122"/>
+              </a:rPr>
+              <a:t>房价预测示例</a:t>
+            </a:r>
+          </a:p>
+        </p:txBody>
+      </p:sp>
+      <p:sp>
+        <p:nvSpPr>
+          <p:cNvPr id="3" name="Rectangle 2">
+            <a:extLst>
+              <a:ext uri="{FF2B5EF4-FFF2-40B4-BE49-F238E27FC236}">
+                <a16:creationId xmlns:a16="http://schemas.microsoft.com/office/drawing/2014/main" id="{5E710C4D-413E-4756-925C-1D1C35C57B01}"/>
+              </a:ext>
+            </a:extLst>
+          </p:cNvPr>
+          <p:cNvSpPr/>
+          <p:nvPr/>
+        </p:nvSpPr>
+        <p:spPr>
+          <a:xfrm>
+            <a:off x="251520" y="1556792"/>
+            <a:ext cx="3262432" cy="461665"/>
+          </a:xfrm>
+          <a:prstGeom prst="rect">
+            <a:avLst/>
+          </a:prstGeom>
+        </p:spPr>
+        <p:txBody>
+          <a:bodyPr wrap="none">
+            <a:spAutoFit/>
+          </a:bodyPr>
+          <a:lstStyle/>
+          <a:p>
+            <a:pPr>
+              <a:defRPr/>
+            </a:pPr>
+            <a:r>
+              <a:rPr lang="zh-CN" altLang="en-US" sz="2400" dirty="0">
+                <a:solidFill>
+                  <a:schemeClr val="bg1"/>
+                </a:solidFill>
+                <a:latin typeface="Arial" charset="0"/>
+              </a:rPr>
+              <a:t>房价和哪些因素有关？</a:t>
+            </a:r>
+            <a:endParaRPr lang="en-US" altLang="zh-CN" sz="2400" dirty="0">
+              <a:solidFill>
+                <a:schemeClr val="bg1"/>
+              </a:solidFill>
+              <a:latin typeface="Arial" charset="0"/>
+            </a:endParaRPr>
+          </a:p>
+        </p:txBody>
+      </p:sp>
+      <p:graphicFrame>
+        <p:nvGraphicFramePr>
+          <p:cNvPr id="2" name="Diagram 1">
+            <a:extLst>
+              <a:ext uri="{FF2B5EF4-FFF2-40B4-BE49-F238E27FC236}">
+                <a16:creationId xmlns:a16="http://schemas.microsoft.com/office/drawing/2014/main" id="{E255A650-66CD-41F3-B480-290206010322}"/>
+              </a:ext>
+            </a:extLst>
+          </p:cNvPr>
+          <p:cNvGraphicFramePr/>
+          <p:nvPr>
+            <p:extLst>
+              <p:ext uri="{D42A27DB-BD31-4B8C-83A1-F6EECF244321}">
+                <p14:modId xmlns:p14="http://schemas.microsoft.com/office/powerpoint/2010/main" val="2030907437"/>
+              </p:ext>
+            </p:extLst>
+          </p:nvPr>
+        </p:nvGraphicFramePr>
+        <p:xfrm>
+          <a:off x="1524000" y="1841698"/>
+          <a:ext cx="6096000" cy="4064000"/>
+        </p:xfrm>
+        <a:graphic>
+          <a:graphicData uri="http://schemas.openxmlformats.org/drawingml/2006/diagram">
+            <dgm:relIds xmlns:dgm="http://schemas.openxmlformats.org/drawingml/2006/diagram" xmlns:r="http://schemas.openxmlformats.org/officeDocument/2006/relationships" r:dm="rId3" r:lo="rId4" r:qs="rId5" r:cs="rId6"/>
+          </a:graphicData>
+        </a:graphic>
+      </p:graphicFrame>
+    </p:spTree>
+    <p:extLst>
+      <p:ext uri="{BB962C8B-B14F-4D97-AF65-F5344CB8AC3E}">
+        <p14:creationId xmlns:p14="http://schemas.microsoft.com/office/powerpoint/2010/main" val="4196043933"/>
+      </p:ext>
+    </p:extLst>
+  </p:cSld>
+  <p:clrMapOvr>
+    <a:masterClrMapping/>
+  </p:clrMapOvr>
+</p:sld>
+</file>
+
+<file path=ppt/slides/slide11.xml><?xml version="1.0" encoding="utf-8"?>
 <p:sld xmlns:a="http://schemas.openxmlformats.org/drawingml/2006/main" xmlns:r="http://schemas.openxmlformats.org/officeDocument/2006/relationships" xmlns:p="http://schemas.openxmlformats.org/presentationml/2006/main">
   <p:cSld>
     <p:spTree>
@@ -17711,286 +18074,6 @@
 </p:sld>
 </file>
 
-<file path=ppt/slides/slide11.xml><?xml version="1.0" encoding="utf-8"?>
-<p:sld xmlns:a="http://schemas.openxmlformats.org/drawingml/2006/main" xmlns:r="http://schemas.openxmlformats.org/officeDocument/2006/relationships" xmlns:p="http://schemas.openxmlformats.org/presentationml/2006/main">
-  <p:cSld>
-    <p:spTree>
-      <p:nvGrpSpPr>
-        <p:cNvPr id="1" name=""/>
-        <p:cNvGrpSpPr/>
-        <p:nvPr/>
-      </p:nvGrpSpPr>
-      <p:grpSpPr>
-        <a:xfrm>
-          <a:off x="0" y="0"/>
-          <a:ext cx="0" cy="0"/>
-          <a:chOff x="0" y="0"/>
-          <a:chExt cx="0" cy="0"/>
-        </a:xfrm>
-      </p:grpSpPr>
-      <p:sp>
-        <p:nvSpPr>
-          <p:cNvPr id="4098" name="TextBox 2">
-            <a:extLst>
-              <a:ext uri="{FF2B5EF4-FFF2-40B4-BE49-F238E27FC236}">
-                <a16:creationId xmlns:a16="http://schemas.microsoft.com/office/drawing/2014/main" id="{5552ED83-0001-4E47-A09B-F49C592A8E24}"/>
-              </a:ext>
-            </a:extLst>
-          </p:cNvPr>
-          <p:cNvSpPr txBox="1">
-            <a:spLocks noChangeArrowheads="1"/>
-          </p:cNvSpPr>
-          <p:nvPr/>
-        </p:nvSpPr>
-        <p:spPr bwMode="auto">
-          <a:xfrm>
-            <a:off x="179388" y="530225"/>
-            <a:ext cx="6913562" cy="830263"/>
-          </a:xfrm>
-          <a:prstGeom prst="rect">
-            <a:avLst/>
-          </a:prstGeom>
-          <a:noFill/>
-          <a:ln>
-            <a:noFill/>
-          </a:ln>
-          <a:extLst>
-            <a:ext uri="{909E8E84-426E-40DD-AFC4-6F175D3DCCD1}">
-              <a14:hiddenFill xmlns:a14="http://schemas.microsoft.com/office/drawing/2010/main">
-                <a:solidFill>
-                  <a:srgbClr val="FFFFFF"/>
-                </a:solidFill>
-              </a14:hiddenFill>
-            </a:ext>
-            <a:ext uri="{91240B29-F687-4F45-9708-019B960494DF}">
-              <a14:hiddenLine xmlns:a14="http://schemas.microsoft.com/office/drawing/2010/main" w="9525">
-                <a:solidFill>
-                  <a:srgbClr val="000000"/>
-                </a:solidFill>
-                <a:miter lim="800000"/>
-                <a:headEnd/>
-                <a:tailEnd/>
-              </a14:hiddenLine>
-            </a:ext>
-          </a:extLst>
-        </p:spPr>
-        <p:txBody>
-          <a:bodyPr>
-            <a:spAutoFit/>
-          </a:bodyPr>
-          <a:lstStyle>
-            <a:lvl1pPr eaLnBrk="0" hangingPunct="0">
-              <a:defRPr>
-                <a:solidFill>
-                  <a:schemeClr val="tx1"/>
-                </a:solidFill>
-                <a:latin typeface="Arial" panose="020B0604020202020204" pitchFamily="34" charset="0"/>
-                <a:ea typeface="宋体" panose="02010600030101010101" pitchFamily="2" charset="-122"/>
-              </a:defRPr>
-            </a:lvl1pPr>
-            <a:lvl2pPr marL="742950" indent="-285750" eaLnBrk="0" hangingPunct="0">
-              <a:defRPr>
-                <a:solidFill>
-                  <a:schemeClr val="tx1"/>
-                </a:solidFill>
-                <a:latin typeface="Arial" panose="020B0604020202020204" pitchFamily="34" charset="0"/>
-                <a:ea typeface="宋体" panose="02010600030101010101" pitchFamily="2" charset="-122"/>
-              </a:defRPr>
-            </a:lvl2pPr>
-            <a:lvl3pPr marL="1143000" indent="-228600" eaLnBrk="0" hangingPunct="0">
-              <a:defRPr>
-                <a:solidFill>
-                  <a:schemeClr val="tx1"/>
-                </a:solidFill>
-                <a:latin typeface="Arial" panose="020B0604020202020204" pitchFamily="34" charset="0"/>
-                <a:ea typeface="宋体" panose="02010600030101010101" pitchFamily="2" charset="-122"/>
-              </a:defRPr>
-            </a:lvl3pPr>
-            <a:lvl4pPr marL="1600200" indent="-228600" eaLnBrk="0" hangingPunct="0">
-              <a:defRPr>
-                <a:solidFill>
-                  <a:schemeClr val="tx1"/>
-                </a:solidFill>
-                <a:latin typeface="Arial" panose="020B0604020202020204" pitchFamily="34" charset="0"/>
-                <a:ea typeface="宋体" panose="02010600030101010101" pitchFamily="2" charset="-122"/>
-              </a:defRPr>
-            </a:lvl4pPr>
-            <a:lvl5pPr marL="2057400" indent="-228600" eaLnBrk="0" hangingPunct="0">
-              <a:defRPr>
-                <a:solidFill>
-                  <a:schemeClr val="tx1"/>
-                </a:solidFill>
-                <a:latin typeface="Arial" panose="020B0604020202020204" pitchFamily="34" charset="0"/>
-                <a:ea typeface="宋体" panose="02010600030101010101" pitchFamily="2" charset="-122"/>
-              </a:defRPr>
-            </a:lvl5pPr>
-            <a:lvl6pPr marL="2514600" indent="-228600" eaLnBrk="0" fontAlgn="base" hangingPunct="0">
-              <a:spcBef>
-                <a:spcPct val="0"/>
-              </a:spcBef>
-              <a:spcAft>
-                <a:spcPct val="0"/>
-              </a:spcAft>
-              <a:defRPr>
-                <a:solidFill>
-                  <a:schemeClr val="tx1"/>
-                </a:solidFill>
-                <a:latin typeface="Arial" panose="020B0604020202020204" pitchFamily="34" charset="0"/>
-                <a:ea typeface="宋体" panose="02010600030101010101" pitchFamily="2" charset="-122"/>
-              </a:defRPr>
-            </a:lvl6pPr>
-            <a:lvl7pPr marL="2971800" indent="-228600" eaLnBrk="0" fontAlgn="base" hangingPunct="0">
-              <a:spcBef>
-                <a:spcPct val="0"/>
-              </a:spcBef>
-              <a:spcAft>
-                <a:spcPct val="0"/>
-              </a:spcAft>
-              <a:defRPr>
-                <a:solidFill>
-                  <a:schemeClr val="tx1"/>
-                </a:solidFill>
-                <a:latin typeface="Arial" panose="020B0604020202020204" pitchFamily="34" charset="0"/>
-                <a:ea typeface="宋体" panose="02010600030101010101" pitchFamily="2" charset="-122"/>
-              </a:defRPr>
-            </a:lvl7pPr>
-            <a:lvl8pPr marL="3429000" indent="-228600" eaLnBrk="0" fontAlgn="base" hangingPunct="0">
-              <a:spcBef>
-                <a:spcPct val="0"/>
-              </a:spcBef>
-              <a:spcAft>
-                <a:spcPct val="0"/>
-              </a:spcAft>
-              <a:defRPr>
-                <a:solidFill>
-                  <a:schemeClr val="tx1"/>
-                </a:solidFill>
-                <a:latin typeface="Arial" panose="020B0604020202020204" pitchFamily="34" charset="0"/>
-                <a:ea typeface="宋体" panose="02010600030101010101" pitchFamily="2" charset="-122"/>
-              </a:defRPr>
-            </a:lvl8pPr>
-            <a:lvl9pPr marL="3886200" indent="-228600" eaLnBrk="0" fontAlgn="base" hangingPunct="0">
-              <a:spcBef>
-                <a:spcPct val="0"/>
-              </a:spcBef>
-              <a:spcAft>
-                <a:spcPct val="0"/>
-              </a:spcAft>
-              <a:defRPr>
-                <a:solidFill>
-                  <a:schemeClr val="tx1"/>
-                </a:solidFill>
-                <a:latin typeface="Arial" panose="020B0604020202020204" pitchFamily="34" charset="0"/>
-                <a:ea typeface="宋体" panose="02010600030101010101" pitchFamily="2" charset="-122"/>
-              </a:defRPr>
-            </a:lvl9pPr>
-          </a:lstStyle>
-          <a:p>
-            <a:pPr eaLnBrk="1" hangingPunct="1"/>
-            <a:r>
-              <a:rPr lang="zh-CN" altLang="en-US" sz="4800" dirty="0">
-                <a:solidFill>
-                  <a:schemeClr val="bg1"/>
-                </a:solidFill>
-                <a:latin typeface="微软雅黑" panose="020B0503020204020204" pitchFamily="34" charset="-122"/>
-                <a:ea typeface="微软雅黑" panose="020B0503020204020204" pitchFamily="34" charset="-122"/>
-              </a:rPr>
-              <a:t>房价预测示例</a:t>
-            </a:r>
-          </a:p>
-        </p:txBody>
-      </p:sp>
-      <p:sp>
-        <p:nvSpPr>
-          <p:cNvPr id="3" name="Rectangle 2">
-            <a:extLst>
-              <a:ext uri="{FF2B5EF4-FFF2-40B4-BE49-F238E27FC236}">
-                <a16:creationId xmlns:a16="http://schemas.microsoft.com/office/drawing/2014/main" id="{5E710C4D-413E-4756-925C-1D1C35C57B01}"/>
-              </a:ext>
-            </a:extLst>
-          </p:cNvPr>
-          <p:cNvSpPr/>
-          <p:nvPr/>
-        </p:nvSpPr>
-        <p:spPr>
-          <a:xfrm>
-            <a:off x="251520" y="1556792"/>
-            <a:ext cx="1415772" cy="461665"/>
-          </a:xfrm>
-          <a:prstGeom prst="rect">
-            <a:avLst/>
-          </a:prstGeom>
-        </p:spPr>
-        <p:txBody>
-          <a:bodyPr wrap="none">
-            <a:spAutoFit/>
-          </a:bodyPr>
-          <a:lstStyle/>
-          <a:p>
-            <a:pPr>
-              <a:defRPr/>
-            </a:pPr>
-            <a:r>
-              <a:rPr lang="zh-CN" altLang="en-US" sz="2400" dirty="0">
-                <a:solidFill>
-                  <a:schemeClr val="bg1"/>
-                </a:solidFill>
-                <a:latin typeface="Arial" charset="0"/>
-              </a:rPr>
-              <a:t>模型训练</a:t>
-            </a:r>
-            <a:endParaRPr lang="en-US" altLang="zh-CN" sz="2400" dirty="0">
-              <a:solidFill>
-                <a:schemeClr val="bg1"/>
-              </a:solidFill>
-              <a:latin typeface="Arial" charset="0"/>
-            </a:endParaRPr>
-          </a:p>
-        </p:txBody>
-      </p:sp>
-      <p:pic>
-        <p:nvPicPr>
-          <p:cNvPr id="2" name="Picture 1">
-            <a:extLst>
-              <a:ext uri="{FF2B5EF4-FFF2-40B4-BE49-F238E27FC236}">
-                <a16:creationId xmlns:a16="http://schemas.microsoft.com/office/drawing/2014/main" id="{04E10473-3928-4A7C-AC92-989E211888B7}"/>
-              </a:ext>
-            </a:extLst>
-          </p:cNvPr>
-          <p:cNvPicPr>
-            <a:picLocks noChangeAspect="1"/>
-          </p:cNvPicPr>
-          <p:nvPr/>
-        </p:nvPicPr>
-        <p:blipFill>
-          <a:blip r:embed="rId3"/>
-          <a:stretch>
-            <a:fillRect/>
-          </a:stretch>
-        </p:blipFill>
-        <p:spPr>
-          <a:xfrm>
-            <a:off x="899592" y="2780928"/>
-            <a:ext cx="6897063" cy="2610214"/>
-          </a:xfrm>
-          <a:prstGeom prst="rect">
-            <a:avLst/>
-          </a:prstGeom>
-        </p:spPr>
-      </p:pic>
-    </p:spTree>
-    <p:extLst>
-      <p:ext uri="{BB962C8B-B14F-4D97-AF65-F5344CB8AC3E}">
-        <p14:creationId xmlns:p14="http://schemas.microsoft.com/office/powerpoint/2010/main" val="2524864930"/>
-      </p:ext>
-    </p:extLst>
-  </p:cSld>
-  <p:clrMapOvr>
-    <a:masterClrMapping/>
-  </p:clrMapOvr>
-</p:sld>
-</file>
-
 <file path=ppt/slides/slide12.xml><?xml version="1.0" encoding="utf-8"?>
 <p:sld xmlns:a="http://schemas.openxmlformats.org/drawingml/2006/main" xmlns:r="http://schemas.openxmlformats.org/officeDocument/2006/relationships" xmlns:p="http://schemas.openxmlformats.org/presentationml/2006/main">
   <p:cSld>
@@ -18194,8 +18277,8 @@
         </p:nvSpPr>
         <p:spPr>
           <a:xfrm>
-            <a:off x="251520" y="1450218"/>
-            <a:ext cx="4333238" cy="1692771"/>
+            <a:off x="251520" y="1556792"/>
+            <a:ext cx="1415772" cy="461665"/>
           </a:xfrm>
           <a:prstGeom prst="rect">
             <a:avLst/>
@@ -18217,7 +18300,7 @@
                 </a:solidFill>
                 <a:latin typeface="Arial" charset="0"/>
               </a:rPr>
-              <a:t>模型优化</a:t>
+              <a:t>模型训练</a:t>
             </a:r>
             <a:endParaRPr lang="en-US" altLang="zh-CN" sz="2400" dirty="0">
               <a:solidFill>
@@ -18226,111 +18309,6 @@
               <a:latin typeface="Arial" charset="0"/>
             </a:endParaRPr>
           </a:p>
-          <a:p>
-            <a:pPr>
-              <a:defRPr/>
-            </a:pPr>
-            <a:r>
-              <a:rPr lang="zh-CN" altLang="en-US" sz="2000" dirty="0">
-                <a:solidFill>
-                  <a:schemeClr val="bg1"/>
-                </a:solidFill>
-                <a:latin typeface="Arial" charset="0"/>
-              </a:rPr>
-              <a:t>训练效率：归一化，加快收敛速度</a:t>
-            </a:r>
-            <a:endParaRPr lang="en-US" altLang="zh-CN" sz="2000" dirty="0">
-              <a:solidFill>
-                <a:schemeClr val="bg1"/>
-              </a:solidFill>
-              <a:latin typeface="Arial" charset="0"/>
-            </a:endParaRPr>
-          </a:p>
-          <a:p>
-            <a:pPr>
-              <a:defRPr/>
-            </a:pPr>
-            <a:r>
-              <a:rPr lang="zh-CN" altLang="en-US" sz="2000" dirty="0">
-                <a:solidFill>
-                  <a:schemeClr val="bg1"/>
-                </a:solidFill>
-                <a:latin typeface="Arial" charset="0"/>
-              </a:rPr>
-              <a:t>准确性：优化欠拟合</a:t>
-            </a:r>
-            <a:endParaRPr lang="en-US" altLang="zh-CN" sz="2000" dirty="0">
-              <a:solidFill>
-                <a:schemeClr val="bg1"/>
-              </a:solidFill>
-              <a:latin typeface="Arial" charset="0"/>
-            </a:endParaRPr>
-          </a:p>
-          <a:p>
-            <a:pPr marL="800100" lvl="1" indent="-342900">
-              <a:buFont typeface="Arial" panose="020B0604020202020204" pitchFamily="34" charset="0"/>
-              <a:buChar char="•"/>
-              <a:defRPr/>
-            </a:pPr>
-            <a:r>
-              <a:rPr lang="zh-CN" altLang="en-US" sz="2000" dirty="0">
-                <a:solidFill>
-                  <a:schemeClr val="bg1"/>
-                </a:solidFill>
-                <a:latin typeface="Arial" charset="0"/>
-              </a:rPr>
-              <a:t>挖掘更多输入特征</a:t>
-            </a:r>
-            <a:endParaRPr lang="en-US" altLang="zh-CN" sz="2000" dirty="0">
-              <a:solidFill>
-                <a:schemeClr val="bg1"/>
-              </a:solidFill>
-              <a:latin typeface="Arial" charset="0"/>
-            </a:endParaRPr>
-          </a:p>
-          <a:p>
-            <a:pPr marL="800100" lvl="1" indent="-342900">
-              <a:buFont typeface="Arial" panose="020B0604020202020204" pitchFamily="34" charset="0"/>
-              <a:buChar char="•"/>
-              <a:defRPr/>
-            </a:pPr>
-            <a:r>
-              <a:rPr lang="zh-CN" altLang="en-US" sz="2000" dirty="0">
-                <a:solidFill>
-                  <a:schemeClr val="bg1"/>
-                </a:solidFill>
-                <a:latin typeface="Arial" charset="0"/>
-              </a:rPr>
-              <a:t>增加多项式特征</a:t>
-            </a:r>
-            <a:r>
-              <a:rPr lang="en-US" altLang="zh-CN" sz="2000" dirty="0">
-                <a:solidFill>
-                  <a:schemeClr val="bg1"/>
-                </a:solidFill>
-                <a:latin typeface="Arial" charset="0"/>
-              </a:rPr>
-              <a:t>: x1*x2, x1</a:t>
-            </a:r>
-            <a:r>
-              <a:rPr lang="en-US" altLang="zh-CN" sz="2000" baseline="30000" dirty="0">
-                <a:solidFill>
-                  <a:schemeClr val="bg1"/>
-                </a:solidFill>
-                <a:latin typeface="Arial" charset="0"/>
-              </a:rPr>
-              <a:t>2</a:t>
-            </a:r>
-            <a:r>
-              <a:rPr lang="en-US" altLang="zh-CN" sz="2000" dirty="0">
-                <a:solidFill>
-                  <a:schemeClr val="bg1"/>
-                </a:solidFill>
-                <a:latin typeface="Arial" charset="0"/>
-              </a:rPr>
-              <a:t>…</a:t>
-            </a:r>
-          </a:p>
         </p:txBody>
       </p:sp>
       <p:pic>
@@ -18338,7 +18316,7 @@
           <p:cNvPr id="2" name="Picture 1">
             <a:extLst>
               <a:ext uri="{FF2B5EF4-FFF2-40B4-BE49-F238E27FC236}">
-                <a16:creationId xmlns:a16="http://schemas.microsoft.com/office/drawing/2014/main" id="{997F2CC6-B771-481B-93FF-D9A1FF7A128A}"/>
+                <a16:creationId xmlns:a16="http://schemas.microsoft.com/office/drawing/2014/main" id="{04E10473-3928-4A7C-AC92-989E211888B7}"/>
               </a:ext>
             </a:extLst>
           </p:cNvPr>
@@ -18355,8 +18333,8 @@
         </p:blipFill>
         <p:spPr>
           <a:xfrm>
-            <a:off x="1475656" y="3284984"/>
-            <a:ext cx="6887536" cy="3343742"/>
+            <a:off x="899592" y="2780928"/>
+            <a:ext cx="6897063" cy="2610214"/>
           </a:xfrm>
           <a:prstGeom prst="rect">
             <a:avLst/>
@@ -18366,7 +18344,7 @@
     </p:spTree>
     <p:extLst>
       <p:ext uri="{BB962C8B-B14F-4D97-AF65-F5344CB8AC3E}">
-        <p14:creationId xmlns:p14="http://schemas.microsoft.com/office/powerpoint/2010/main" val="884701500"/>
+        <p14:creationId xmlns:p14="http://schemas.microsoft.com/office/powerpoint/2010/main" val="2524864930"/>
       </p:ext>
     </p:extLst>
   </p:cSld>
@@ -18560,7 +18538,7 @@
                 <a:latin typeface="微软雅黑" panose="020B0503020204020204" pitchFamily="34" charset="-122"/>
                 <a:ea typeface="微软雅黑" panose="020B0503020204020204" pitchFamily="34" charset="-122"/>
               </a:rPr>
-              <a:t>线性回归总结</a:t>
+              <a:t>房价预测示例</a:t>
             </a:r>
           </a:p>
         </p:txBody>
@@ -18579,8 +18557,8 @@
         </p:nvSpPr>
         <p:spPr>
           <a:xfrm>
-            <a:off x="227013" y="1844824"/>
-            <a:ext cx="8392041" cy="2246769"/>
+            <a:off x="251520" y="1450218"/>
+            <a:ext cx="4333238" cy="1692771"/>
           </a:xfrm>
           <a:prstGeom prst="rect">
             <a:avLst/>
@@ -18596,13 +18574,33 @@
               <a:defRPr/>
             </a:pPr>
             <a:r>
-              <a:rPr lang="zh-CN" altLang="en-US" sz="2000" dirty="0">
+              <a:rPr lang="zh-CN" altLang="en-US" sz="2400" dirty="0">
                 <a:solidFill>
                   <a:schemeClr val="bg1"/>
                 </a:solidFill>
                 <a:latin typeface="Arial" charset="0"/>
               </a:rPr>
-              <a:t>线性模型是参数化的，仅有少量数值参数需要从数据中学习，形式简单，</a:t>
+              <a:t>模型优化</a:t>
+            </a:r>
+            <a:endParaRPr lang="en-US" altLang="zh-CN" sz="2400" dirty="0">
+              <a:solidFill>
+                <a:schemeClr val="bg1"/>
+              </a:solidFill>
+              <a:latin typeface="Arial" charset="0"/>
+            </a:endParaRPr>
+          </a:p>
+          <a:p>
+            <a:pPr>
+              <a:defRPr/>
+            </a:pPr>
+            <a:r>
+              <a:rPr lang="zh-CN" altLang="en-US" sz="2000" dirty="0">
+                <a:solidFill>
+                  <a:schemeClr val="bg1"/>
+                </a:solidFill>
+                <a:latin typeface="Arial" charset="0"/>
+              </a:rPr>
+              <a:t>训练效率：归一化，加快收敛速度</a:t>
             </a:r>
             <a:endParaRPr lang="en-US" altLang="zh-CN" sz="2000" dirty="0">
               <a:solidFill>
@@ -18622,7 +18620,7 @@
                 </a:solidFill>
                 <a:latin typeface="Arial" charset="0"/>
               </a:rPr>
-              <a:t>易于建模，有很好的解释性。</a:t>
+              <a:t>准确性：优化欠拟合</a:t>
             </a:r>
             <a:endParaRPr lang="en-US" altLang="zh-CN" sz="2000" dirty="0">
               <a:solidFill>
@@ -18632,7 +18630,9 @@
             </a:endParaRPr>
           </a:p>
           <a:p>
-            <a:pPr>
+            <a:pPr marL="800100" lvl="1" indent="-342900">
+              <a:buFont typeface="Arial" panose="020B0604020202020204" pitchFamily="34" charset="0"/>
+              <a:buChar char="•"/>
               <a:defRPr/>
             </a:pPr>
             <a:r>
@@ -18642,7 +18642,7 @@
                 </a:solidFill>
                 <a:latin typeface="Arial" charset="0"/>
               </a:rPr>
-              <a:t>线性模型比较稳定，训练数据微小的波动只会对模型的学习结果产生极</a:t>
+              <a:t>挖掘更多输入特征</a:t>
             </a:r>
             <a:endParaRPr lang="en-US" altLang="zh-CN" sz="2000" dirty="0">
               <a:solidFill>
@@ -18652,7 +18652,9 @@
             </a:endParaRPr>
           </a:p>
           <a:p>
-            <a:pPr>
+            <a:pPr marL="800100" lvl="1" indent="-342900">
+              <a:buFont typeface="Arial" panose="020B0604020202020204" pitchFamily="34" charset="0"/>
+              <a:buChar char="•"/>
               <a:defRPr/>
             </a:pPr>
             <a:r>
@@ -18662,72 +18664,72 @@
                 </a:solidFill>
                 <a:latin typeface="Arial" charset="0"/>
               </a:rPr>
-              <a:t>为有限的影响。</a:t>
+              <a:t>增加多项式特征</a:t>
             </a:r>
-            <a:endParaRPr lang="en-US" altLang="zh-CN" sz="2000" dirty="0">
-              <a:solidFill>
-                <a:schemeClr val="bg1"/>
-              </a:solidFill>
-              <a:latin typeface="Arial" charset="0"/>
-            </a:endParaRPr>
-          </a:p>
-          <a:p>
-            <a:pPr>
-              <a:defRPr/>
-            </a:pPr>
             <a:r>
-              <a:rPr lang="zh-CN" altLang="en-US" sz="2000" dirty="0">
+              <a:rPr lang="en-US" altLang="zh-CN" sz="2000" dirty="0">
                 <a:solidFill>
                   <a:schemeClr val="bg1"/>
                 </a:solidFill>
                 <a:latin typeface="Arial" charset="0"/>
               </a:rPr>
-              <a:t>参数较少，不易产生过拟合。</a:t>
+              <a:t>: x1*x2, x1</a:t>
             </a:r>
-            <a:endParaRPr lang="en-US" altLang="zh-CN" sz="2000" dirty="0">
-              <a:solidFill>
-                <a:schemeClr val="bg1"/>
-              </a:solidFill>
-              <a:latin typeface="Arial" charset="0"/>
-            </a:endParaRPr>
-          </a:p>
-          <a:p>
-            <a:pPr>
-              <a:defRPr/>
-            </a:pPr>
-            <a:endParaRPr lang="en-US" altLang="zh-CN" sz="2000" dirty="0">
-              <a:solidFill>
-                <a:schemeClr val="bg1"/>
-              </a:solidFill>
-              <a:latin typeface="Arial" charset="0"/>
-            </a:endParaRPr>
-          </a:p>
-          <a:p>
-            <a:pPr>
-              <a:defRPr/>
-            </a:pPr>
             <a:r>
-              <a:rPr lang="zh-CN" altLang="en-US" sz="2000" dirty="0">
+              <a:rPr lang="en-US" altLang="zh-CN" sz="2000" baseline="30000" dirty="0">
                 <a:solidFill>
                   <a:schemeClr val="bg1"/>
                 </a:solidFill>
                 <a:latin typeface="Arial" charset="0"/>
               </a:rPr>
-              <a:t>使用场景：当数据量有限，且希望避免过拟合，底方差，高偏差</a:t>
+              <a:t>2</a:t>
             </a:r>
-            <a:endParaRPr lang="en-US" altLang="zh-CN" sz="2000" dirty="0">
-              <a:solidFill>
-                <a:schemeClr val="bg1"/>
-              </a:solidFill>
-              <a:latin typeface="Arial" charset="0"/>
-            </a:endParaRPr>
+            <a:r>
+              <a:rPr lang="en-US" altLang="zh-CN" sz="2000" dirty="0">
+                <a:solidFill>
+                  <a:schemeClr val="bg1"/>
+                </a:solidFill>
+                <a:latin typeface="Arial" charset="0"/>
+              </a:rPr>
+              <a:t>…</a:t>
+            </a:r>
           </a:p>
         </p:txBody>
       </p:sp>
+      <p:pic>
+        <p:nvPicPr>
+          <p:cNvPr id="2" name="Picture 1">
+            <a:extLst>
+              <a:ext uri="{FF2B5EF4-FFF2-40B4-BE49-F238E27FC236}">
+                <a16:creationId xmlns:a16="http://schemas.microsoft.com/office/drawing/2014/main" id="{997F2CC6-B771-481B-93FF-D9A1FF7A128A}"/>
+              </a:ext>
+            </a:extLst>
+          </p:cNvPr>
+          <p:cNvPicPr>
+            <a:picLocks noChangeAspect="1"/>
+          </p:cNvPicPr>
+          <p:nvPr/>
+        </p:nvPicPr>
+        <p:blipFill>
+          <a:blip r:embed="rId3"/>
+          <a:stretch>
+            <a:fillRect/>
+          </a:stretch>
+        </p:blipFill>
+        <p:spPr>
+          <a:xfrm>
+            <a:off x="1475656" y="3284984"/>
+            <a:ext cx="6887536" cy="3343742"/>
+          </a:xfrm>
+          <a:prstGeom prst="rect">
+            <a:avLst/>
+          </a:prstGeom>
+        </p:spPr>
+      </p:pic>
     </p:spTree>
     <p:extLst>
       <p:ext uri="{BB962C8B-B14F-4D97-AF65-F5344CB8AC3E}">
-        <p14:creationId xmlns:p14="http://schemas.microsoft.com/office/powerpoint/2010/main" val="814592166"/>
+        <p14:creationId xmlns:p14="http://schemas.microsoft.com/office/powerpoint/2010/main" val="884701500"/>
       </p:ext>
     </p:extLst>
   </p:cSld>
@@ -18921,35 +18923,34 @@
                 <a:latin typeface="微软雅黑" panose="020B0503020204020204" pitchFamily="34" charset="-122"/>
                 <a:ea typeface="微软雅黑" panose="020B0503020204020204" pitchFamily="34" charset="-122"/>
               </a:rPr>
-              <a:t>其他回归模型</a:t>
+              <a:t>线性回归总结</a:t>
             </a:r>
           </a:p>
         </p:txBody>
       </p:sp>
       <p:sp>
         <p:nvSpPr>
-          <p:cNvPr id="5" name="TextBox 4">
+          <p:cNvPr id="3" name="Rectangle 2">
             <a:extLst>
               <a:ext uri="{FF2B5EF4-FFF2-40B4-BE49-F238E27FC236}">
-                <a16:creationId xmlns:a16="http://schemas.microsoft.com/office/drawing/2014/main" id="{E8A991AE-3688-4E36-95ED-0003B8B99099}"/>
+                <a16:creationId xmlns:a16="http://schemas.microsoft.com/office/drawing/2014/main" id="{5E710C4D-413E-4756-925C-1D1C35C57B01}"/>
               </a:ext>
             </a:extLst>
           </p:cNvPr>
-          <p:cNvSpPr txBox="1"/>
+          <p:cNvSpPr/>
           <p:nvPr/>
         </p:nvSpPr>
         <p:spPr>
           <a:xfrm>
-            <a:off x="323850" y="1628775"/>
-            <a:ext cx="8569325" cy="1354217"/>
+            <a:off x="227013" y="1844824"/>
+            <a:ext cx="8392041" cy="2246769"/>
           </a:xfrm>
           <a:prstGeom prst="rect">
             <a:avLst/>
           </a:prstGeom>
-          <a:noFill/>
         </p:spPr>
         <p:txBody>
-          <a:bodyPr>
+          <a:bodyPr wrap="none">
             <a:spAutoFit/>
           </a:bodyPr>
           <a:lstStyle/>
@@ -18958,15 +18959,15 @@
               <a:defRPr/>
             </a:pPr>
             <a:r>
-              <a:rPr lang="zh-CN" altLang="en-US" sz="2800" dirty="0">
+              <a:rPr lang="zh-CN" altLang="en-US" sz="2000" dirty="0">
                 <a:solidFill>
                   <a:schemeClr val="bg1"/>
                 </a:solidFill>
                 <a:latin typeface="Arial" charset="0"/>
               </a:rPr>
-              <a:t>逻辑回归</a:t>
+              <a:t>线性模型是参数化的，仅有少量数值参数需要从数据中学习，形式简单，</a:t>
             </a:r>
-            <a:endParaRPr lang="en-US" altLang="zh-CN" sz="2800" dirty="0">
+            <a:endParaRPr lang="en-US" altLang="zh-CN" sz="2000" dirty="0">
               <a:solidFill>
                 <a:schemeClr val="bg1"/>
               </a:solidFill>
@@ -18978,120 +18979,118 @@
               <a:defRPr/>
             </a:pPr>
             <a:r>
-              <a:rPr lang="zh-CN" altLang="en-US" dirty="0">
+              <a:rPr lang="zh-CN" altLang="en-US" sz="2000" dirty="0">
                 <a:solidFill>
                   <a:schemeClr val="bg1"/>
                 </a:solidFill>
                 <a:latin typeface="Arial" charset="0"/>
               </a:rPr>
-              <a:t>实际是用来做分类的。其主要思想是</a:t>
+              <a:t>易于建模，有很好的解释性。</a:t>
             </a:r>
-            <a:r>
-              <a:rPr lang="en-US" altLang="zh-CN" dirty="0">
-                <a:solidFill>
-                  <a:schemeClr val="bg1"/>
-                </a:solidFill>
-                <a:latin typeface="Arial" charset="0"/>
-              </a:rPr>
-              <a:t>: </a:t>
-            </a:r>
-            <a:r>
-              <a:rPr lang="zh-CN" altLang="en-US" dirty="0">
-                <a:solidFill>
-                  <a:schemeClr val="bg1"/>
-                </a:solidFill>
-                <a:latin typeface="Arial" charset="0"/>
-              </a:rPr>
-              <a:t>根据现有数据对分类边界线</a:t>
-            </a:r>
-            <a:r>
-              <a:rPr lang="en-US" altLang="zh-CN" dirty="0">
-                <a:solidFill>
-                  <a:schemeClr val="bg1"/>
-                </a:solidFill>
-                <a:latin typeface="Arial" charset="0"/>
-              </a:rPr>
-              <a:t>(</a:t>
-            </a:r>
-            <a:r>
-              <a:rPr lang="en-US" dirty="0">
-                <a:solidFill>
-                  <a:schemeClr val="bg1"/>
-                </a:solidFill>
-                <a:latin typeface="Arial" charset="0"/>
-              </a:rPr>
-              <a:t>Decision Boundary)</a:t>
-            </a:r>
-            <a:r>
-              <a:rPr lang="zh-CN" altLang="en-US" dirty="0">
-                <a:solidFill>
-                  <a:schemeClr val="bg1"/>
-                </a:solidFill>
-                <a:latin typeface="Arial" charset="0"/>
-              </a:rPr>
-              <a:t>建立回归公式，以此进行分类。其实仅在线性回归的基础上，套用了一个逻辑函数（</a:t>
-            </a:r>
-            <a:r>
-              <a:rPr lang="en-US" altLang="zh-CN" dirty="0">
-                <a:solidFill>
-                  <a:schemeClr val="bg1"/>
-                </a:solidFill>
-                <a:latin typeface="Arial" charset="0"/>
-              </a:rPr>
-              <a:t>Sigmoid</a:t>
-            </a:r>
-            <a:r>
-              <a:rPr lang="zh-CN" altLang="en-US" dirty="0">
-                <a:solidFill>
-                  <a:schemeClr val="bg1"/>
-                </a:solidFill>
-                <a:latin typeface="Arial" charset="0"/>
-              </a:rPr>
-              <a:t>），</a:t>
-            </a:r>
-            <a:endParaRPr lang="en-US" altLang="zh-CN" dirty="0">
+            <a:endParaRPr lang="en-US" altLang="zh-CN" sz="2000" dirty="0">
               <a:solidFill>
                 <a:schemeClr val="bg1"/>
               </a:solidFill>
               <a:latin typeface="Arial" charset="0"/>
             </a:endParaRPr>
           </a:p>
+          <a:p>
+            <a:pPr>
+              <a:defRPr/>
+            </a:pPr>
+            <a:r>
+              <a:rPr lang="zh-CN" altLang="en-US" sz="2000" dirty="0">
+                <a:solidFill>
+                  <a:schemeClr val="bg1"/>
+                </a:solidFill>
+                <a:latin typeface="Arial" charset="0"/>
+              </a:rPr>
+              <a:t>线性模型比较稳定，训练数据微小的波动只会对模型的学习结果产生极</a:t>
+            </a:r>
+            <a:endParaRPr lang="en-US" altLang="zh-CN" sz="2000" dirty="0">
+              <a:solidFill>
+                <a:schemeClr val="bg1"/>
+              </a:solidFill>
+              <a:latin typeface="Arial" charset="0"/>
+            </a:endParaRPr>
+          </a:p>
+          <a:p>
+            <a:pPr>
+              <a:defRPr/>
+            </a:pPr>
+            <a:r>
+              <a:rPr lang="zh-CN" altLang="en-US" sz="2000" dirty="0">
+                <a:solidFill>
+                  <a:schemeClr val="bg1"/>
+                </a:solidFill>
+                <a:latin typeface="Arial" charset="0"/>
+              </a:rPr>
+              <a:t>为有限的影响。</a:t>
+            </a:r>
+            <a:endParaRPr lang="en-US" altLang="zh-CN" sz="2000" dirty="0">
+              <a:solidFill>
+                <a:schemeClr val="bg1"/>
+              </a:solidFill>
+              <a:latin typeface="Arial" charset="0"/>
+            </a:endParaRPr>
+          </a:p>
+          <a:p>
+            <a:pPr>
+              <a:defRPr/>
+            </a:pPr>
+            <a:r>
+              <a:rPr lang="zh-CN" altLang="en-US" sz="2000" dirty="0">
+                <a:solidFill>
+                  <a:schemeClr val="bg1"/>
+                </a:solidFill>
+                <a:latin typeface="Arial" charset="0"/>
+              </a:rPr>
+              <a:t>参数较少，不易产生过拟合。</a:t>
+            </a:r>
+            <a:endParaRPr lang="en-US" altLang="zh-CN" sz="2000" dirty="0">
+              <a:solidFill>
+                <a:schemeClr val="bg1"/>
+              </a:solidFill>
+              <a:latin typeface="Arial" charset="0"/>
+            </a:endParaRPr>
+          </a:p>
+          <a:p>
+            <a:pPr>
+              <a:defRPr/>
+            </a:pPr>
+            <a:endParaRPr lang="en-US" altLang="zh-CN" sz="2000" dirty="0">
+              <a:solidFill>
+                <a:schemeClr val="bg1"/>
+              </a:solidFill>
+              <a:latin typeface="Arial" charset="0"/>
+            </a:endParaRPr>
+          </a:p>
+          <a:p>
+            <a:pPr>
+              <a:defRPr/>
+            </a:pPr>
+            <a:r>
+              <a:rPr lang="zh-CN" altLang="en-US" sz="2000" dirty="0">
+                <a:solidFill>
+                  <a:schemeClr val="bg1"/>
+                </a:solidFill>
+                <a:latin typeface="Arial" charset="0"/>
+              </a:rPr>
+              <a:t>使用场景：当数据量有限，且希望避免过拟合，底方差，高偏差</a:t>
+            </a:r>
+            <a:endParaRPr lang="en-US" altLang="zh-CN" sz="2000" dirty="0">
+              <a:solidFill>
+                <a:schemeClr val="bg1"/>
+              </a:solidFill>
+              <a:latin typeface="Arial" charset="0"/>
+            </a:endParaRPr>
+          </a:p>
         </p:txBody>
       </p:sp>
-      <p:pic>
-        <p:nvPicPr>
-          <p:cNvPr id="2" name="Picture 1">
-            <a:extLst>
-              <a:ext uri="{FF2B5EF4-FFF2-40B4-BE49-F238E27FC236}">
-                <a16:creationId xmlns:a16="http://schemas.microsoft.com/office/drawing/2014/main" id="{BEE1C097-9602-49A6-A559-47E1A13EAA33}"/>
-              </a:ext>
-            </a:extLst>
-          </p:cNvPr>
-          <p:cNvPicPr>
-            <a:picLocks noChangeAspect="1"/>
-          </p:cNvPicPr>
-          <p:nvPr/>
-        </p:nvPicPr>
-        <p:blipFill>
-          <a:blip r:embed="rId2"/>
-          <a:stretch>
-            <a:fillRect/>
-          </a:stretch>
-        </p:blipFill>
-        <p:spPr>
-          <a:xfrm>
-            <a:off x="1652180" y="3095109"/>
-            <a:ext cx="5839640" cy="2962688"/>
-          </a:xfrm>
-          <a:prstGeom prst="rect">
-            <a:avLst/>
-          </a:prstGeom>
-        </p:spPr>
-      </p:pic>
     </p:spTree>
     <p:extLst>
       <p:ext uri="{BB962C8B-B14F-4D97-AF65-F5344CB8AC3E}">
-        <p14:creationId xmlns:p14="http://schemas.microsoft.com/office/powerpoint/2010/main" val="2966611444"/>
+        <p14:creationId xmlns:p14="http://schemas.microsoft.com/office/powerpoint/2010/main" val="814592166"/>
       </p:ext>
     </p:extLst>
   </p:cSld>
@@ -19305,6 +19304,370 @@
         <p:spPr>
           <a:xfrm>
             <a:off x="323850" y="1628775"/>
+            <a:ext cx="8569325" cy="1354217"/>
+          </a:xfrm>
+          <a:prstGeom prst="rect">
+            <a:avLst/>
+          </a:prstGeom>
+          <a:noFill/>
+        </p:spPr>
+        <p:txBody>
+          <a:bodyPr>
+            <a:spAutoFit/>
+          </a:bodyPr>
+          <a:lstStyle/>
+          <a:p>
+            <a:pPr>
+              <a:defRPr/>
+            </a:pPr>
+            <a:r>
+              <a:rPr lang="zh-CN" altLang="en-US" sz="2800" dirty="0">
+                <a:solidFill>
+                  <a:schemeClr val="bg1"/>
+                </a:solidFill>
+                <a:latin typeface="Arial" charset="0"/>
+              </a:rPr>
+              <a:t>逻辑回归</a:t>
+            </a:r>
+            <a:endParaRPr lang="en-US" altLang="zh-CN" sz="2800" dirty="0">
+              <a:solidFill>
+                <a:schemeClr val="bg1"/>
+              </a:solidFill>
+              <a:latin typeface="Arial" charset="0"/>
+            </a:endParaRPr>
+          </a:p>
+          <a:p>
+            <a:pPr>
+              <a:defRPr/>
+            </a:pPr>
+            <a:r>
+              <a:rPr lang="zh-CN" altLang="en-US" dirty="0">
+                <a:solidFill>
+                  <a:schemeClr val="bg1"/>
+                </a:solidFill>
+                <a:latin typeface="Arial" charset="0"/>
+              </a:rPr>
+              <a:t>实际是用来做分类的。其主要思想是</a:t>
+            </a:r>
+            <a:r>
+              <a:rPr lang="en-US" altLang="zh-CN" dirty="0">
+                <a:solidFill>
+                  <a:schemeClr val="bg1"/>
+                </a:solidFill>
+                <a:latin typeface="Arial" charset="0"/>
+              </a:rPr>
+              <a:t>: </a:t>
+            </a:r>
+            <a:r>
+              <a:rPr lang="zh-CN" altLang="en-US" dirty="0">
+                <a:solidFill>
+                  <a:schemeClr val="bg1"/>
+                </a:solidFill>
+                <a:latin typeface="Arial" charset="0"/>
+              </a:rPr>
+              <a:t>根据现有数据对分类边界线</a:t>
+            </a:r>
+            <a:r>
+              <a:rPr lang="en-US" altLang="zh-CN" dirty="0">
+                <a:solidFill>
+                  <a:schemeClr val="bg1"/>
+                </a:solidFill>
+                <a:latin typeface="Arial" charset="0"/>
+              </a:rPr>
+              <a:t>(</a:t>
+            </a:r>
+            <a:r>
+              <a:rPr lang="en-US" dirty="0">
+                <a:solidFill>
+                  <a:schemeClr val="bg1"/>
+                </a:solidFill>
+                <a:latin typeface="Arial" charset="0"/>
+              </a:rPr>
+              <a:t>Decision Boundary)</a:t>
+            </a:r>
+            <a:r>
+              <a:rPr lang="zh-CN" altLang="en-US" dirty="0">
+                <a:solidFill>
+                  <a:schemeClr val="bg1"/>
+                </a:solidFill>
+                <a:latin typeface="Arial" charset="0"/>
+              </a:rPr>
+              <a:t>建立回归公式，以此进行分类。其实仅在线性回归的基础上，套用了一个逻辑函数（</a:t>
+            </a:r>
+            <a:r>
+              <a:rPr lang="en-US" altLang="zh-CN" dirty="0">
+                <a:solidFill>
+                  <a:schemeClr val="bg1"/>
+                </a:solidFill>
+                <a:latin typeface="Arial" charset="0"/>
+              </a:rPr>
+              <a:t>Sigmoid</a:t>
+            </a:r>
+            <a:r>
+              <a:rPr lang="zh-CN" altLang="en-US" dirty="0">
+                <a:solidFill>
+                  <a:schemeClr val="bg1"/>
+                </a:solidFill>
+                <a:latin typeface="Arial" charset="0"/>
+              </a:rPr>
+              <a:t>），</a:t>
+            </a:r>
+            <a:endParaRPr lang="en-US" altLang="zh-CN" dirty="0">
+              <a:solidFill>
+                <a:schemeClr val="bg1"/>
+              </a:solidFill>
+              <a:latin typeface="Arial" charset="0"/>
+            </a:endParaRPr>
+          </a:p>
+        </p:txBody>
+      </p:sp>
+      <p:pic>
+        <p:nvPicPr>
+          <p:cNvPr id="2" name="Picture 1">
+            <a:extLst>
+              <a:ext uri="{FF2B5EF4-FFF2-40B4-BE49-F238E27FC236}">
+                <a16:creationId xmlns:a16="http://schemas.microsoft.com/office/drawing/2014/main" id="{BEE1C097-9602-49A6-A559-47E1A13EAA33}"/>
+              </a:ext>
+            </a:extLst>
+          </p:cNvPr>
+          <p:cNvPicPr>
+            <a:picLocks noChangeAspect="1"/>
+          </p:cNvPicPr>
+          <p:nvPr/>
+        </p:nvPicPr>
+        <p:blipFill>
+          <a:blip r:embed="rId2"/>
+          <a:stretch>
+            <a:fillRect/>
+          </a:stretch>
+        </p:blipFill>
+        <p:spPr>
+          <a:xfrm>
+            <a:off x="1652180" y="3095109"/>
+            <a:ext cx="5839640" cy="2962688"/>
+          </a:xfrm>
+          <a:prstGeom prst="rect">
+            <a:avLst/>
+          </a:prstGeom>
+        </p:spPr>
+      </p:pic>
+    </p:spTree>
+    <p:extLst>
+      <p:ext uri="{BB962C8B-B14F-4D97-AF65-F5344CB8AC3E}">
+        <p14:creationId xmlns:p14="http://schemas.microsoft.com/office/powerpoint/2010/main" val="2966611444"/>
+      </p:ext>
+    </p:extLst>
+  </p:cSld>
+  <p:clrMapOvr>
+    <a:masterClrMapping/>
+  </p:clrMapOvr>
+</p:sld>
+</file>
+
+<file path=ppt/slides/slide16.xml><?xml version="1.0" encoding="utf-8"?>
+<p:sld xmlns:a="http://schemas.openxmlformats.org/drawingml/2006/main" xmlns:r="http://schemas.openxmlformats.org/officeDocument/2006/relationships" xmlns:p="http://schemas.openxmlformats.org/presentationml/2006/main">
+  <p:cSld>
+    <p:spTree>
+      <p:nvGrpSpPr>
+        <p:cNvPr id="1" name=""/>
+        <p:cNvGrpSpPr/>
+        <p:nvPr/>
+      </p:nvGrpSpPr>
+      <p:grpSpPr>
+        <a:xfrm>
+          <a:off x="0" y="0"/>
+          <a:ext cx="0" cy="0"/>
+          <a:chOff x="0" y="0"/>
+          <a:chExt cx="0" cy="0"/>
+        </a:xfrm>
+      </p:grpSpPr>
+      <p:sp>
+        <p:nvSpPr>
+          <p:cNvPr id="4098" name="TextBox 2">
+            <a:extLst>
+              <a:ext uri="{FF2B5EF4-FFF2-40B4-BE49-F238E27FC236}">
+                <a16:creationId xmlns:a16="http://schemas.microsoft.com/office/drawing/2014/main" id="{5552ED83-0001-4E47-A09B-F49C592A8E24}"/>
+              </a:ext>
+            </a:extLst>
+          </p:cNvPr>
+          <p:cNvSpPr txBox="1">
+            <a:spLocks noChangeArrowheads="1"/>
+          </p:cNvSpPr>
+          <p:nvPr/>
+        </p:nvSpPr>
+        <p:spPr bwMode="auto">
+          <a:xfrm>
+            <a:off x="179388" y="530225"/>
+            <a:ext cx="6913562" cy="830263"/>
+          </a:xfrm>
+          <a:prstGeom prst="rect">
+            <a:avLst/>
+          </a:prstGeom>
+          <a:noFill/>
+          <a:ln>
+            <a:noFill/>
+          </a:ln>
+          <a:extLst>
+            <a:ext uri="{909E8E84-426E-40DD-AFC4-6F175D3DCCD1}">
+              <a14:hiddenFill xmlns:a14="http://schemas.microsoft.com/office/drawing/2010/main">
+                <a:solidFill>
+                  <a:srgbClr val="FFFFFF"/>
+                </a:solidFill>
+              </a14:hiddenFill>
+            </a:ext>
+            <a:ext uri="{91240B29-F687-4F45-9708-019B960494DF}">
+              <a14:hiddenLine xmlns:a14="http://schemas.microsoft.com/office/drawing/2010/main" w="9525">
+                <a:solidFill>
+                  <a:srgbClr val="000000"/>
+                </a:solidFill>
+                <a:miter lim="800000"/>
+                <a:headEnd/>
+                <a:tailEnd/>
+              </a14:hiddenLine>
+            </a:ext>
+          </a:extLst>
+        </p:spPr>
+        <p:txBody>
+          <a:bodyPr>
+            <a:spAutoFit/>
+          </a:bodyPr>
+          <a:lstStyle>
+            <a:lvl1pPr eaLnBrk="0" hangingPunct="0">
+              <a:defRPr>
+                <a:solidFill>
+                  <a:schemeClr val="tx1"/>
+                </a:solidFill>
+                <a:latin typeface="Arial" panose="020B0604020202020204" pitchFamily="34" charset="0"/>
+                <a:ea typeface="宋体" panose="02010600030101010101" pitchFamily="2" charset="-122"/>
+              </a:defRPr>
+            </a:lvl1pPr>
+            <a:lvl2pPr marL="742950" indent="-285750" eaLnBrk="0" hangingPunct="0">
+              <a:defRPr>
+                <a:solidFill>
+                  <a:schemeClr val="tx1"/>
+                </a:solidFill>
+                <a:latin typeface="Arial" panose="020B0604020202020204" pitchFamily="34" charset="0"/>
+                <a:ea typeface="宋体" panose="02010600030101010101" pitchFamily="2" charset="-122"/>
+              </a:defRPr>
+            </a:lvl2pPr>
+            <a:lvl3pPr marL="1143000" indent="-228600" eaLnBrk="0" hangingPunct="0">
+              <a:defRPr>
+                <a:solidFill>
+                  <a:schemeClr val="tx1"/>
+                </a:solidFill>
+                <a:latin typeface="Arial" panose="020B0604020202020204" pitchFamily="34" charset="0"/>
+                <a:ea typeface="宋体" panose="02010600030101010101" pitchFamily="2" charset="-122"/>
+              </a:defRPr>
+            </a:lvl3pPr>
+            <a:lvl4pPr marL="1600200" indent="-228600" eaLnBrk="0" hangingPunct="0">
+              <a:defRPr>
+                <a:solidFill>
+                  <a:schemeClr val="tx1"/>
+                </a:solidFill>
+                <a:latin typeface="Arial" panose="020B0604020202020204" pitchFamily="34" charset="0"/>
+                <a:ea typeface="宋体" panose="02010600030101010101" pitchFamily="2" charset="-122"/>
+              </a:defRPr>
+            </a:lvl4pPr>
+            <a:lvl5pPr marL="2057400" indent="-228600" eaLnBrk="0" hangingPunct="0">
+              <a:defRPr>
+                <a:solidFill>
+                  <a:schemeClr val="tx1"/>
+                </a:solidFill>
+                <a:latin typeface="Arial" panose="020B0604020202020204" pitchFamily="34" charset="0"/>
+                <a:ea typeface="宋体" panose="02010600030101010101" pitchFamily="2" charset="-122"/>
+              </a:defRPr>
+            </a:lvl5pPr>
+            <a:lvl6pPr marL="2514600" indent="-228600" eaLnBrk="0" fontAlgn="base" hangingPunct="0">
+              <a:spcBef>
+                <a:spcPct val="0"/>
+              </a:spcBef>
+              <a:spcAft>
+                <a:spcPct val="0"/>
+              </a:spcAft>
+              <a:defRPr>
+                <a:solidFill>
+                  <a:schemeClr val="tx1"/>
+                </a:solidFill>
+                <a:latin typeface="Arial" panose="020B0604020202020204" pitchFamily="34" charset="0"/>
+                <a:ea typeface="宋体" panose="02010600030101010101" pitchFamily="2" charset="-122"/>
+              </a:defRPr>
+            </a:lvl6pPr>
+            <a:lvl7pPr marL="2971800" indent="-228600" eaLnBrk="0" fontAlgn="base" hangingPunct="0">
+              <a:spcBef>
+                <a:spcPct val="0"/>
+              </a:spcBef>
+              <a:spcAft>
+                <a:spcPct val="0"/>
+              </a:spcAft>
+              <a:defRPr>
+                <a:solidFill>
+                  <a:schemeClr val="tx1"/>
+                </a:solidFill>
+                <a:latin typeface="Arial" panose="020B0604020202020204" pitchFamily="34" charset="0"/>
+                <a:ea typeface="宋体" panose="02010600030101010101" pitchFamily="2" charset="-122"/>
+              </a:defRPr>
+            </a:lvl7pPr>
+            <a:lvl8pPr marL="3429000" indent="-228600" eaLnBrk="0" fontAlgn="base" hangingPunct="0">
+              <a:spcBef>
+                <a:spcPct val="0"/>
+              </a:spcBef>
+              <a:spcAft>
+                <a:spcPct val="0"/>
+              </a:spcAft>
+              <a:defRPr>
+                <a:solidFill>
+                  <a:schemeClr val="tx1"/>
+                </a:solidFill>
+                <a:latin typeface="Arial" panose="020B0604020202020204" pitchFamily="34" charset="0"/>
+                <a:ea typeface="宋体" panose="02010600030101010101" pitchFamily="2" charset="-122"/>
+              </a:defRPr>
+            </a:lvl8pPr>
+            <a:lvl9pPr marL="3886200" indent="-228600" eaLnBrk="0" fontAlgn="base" hangingPunct="0">
+              <a:spcBef>
+                <a:spcPct val="0"/>
+              </a:spcBef>
+              <a:spcAft>
+                <a:spcPct val="0"/>
+              </a:spcAft>
+              <a:defRPr>
+                <a:solidFill>
+                  <a:schemeClr val="tx1"/>
+                </a:solidFill>
+                <a:latin typeface="Arial" panose="020B0604020202020204" pitchFamily="34" charset="0"/>
+                <a:ea typeface="宋体" panose="02010600030101010101" pitchFamily="2" charset="-122"/>
+              </a:defRPr>
+            </a:lvl9pPr>
+          </a:lstStyle>
+          <a:p>
+            <a:pPr eaLnBrk="1" hangingPunct="1"/>
+            <a:r>
+              <a:rPr lang="zh-CN" altLang="en-US" sz="4800" dirty="0">
+                <a:solidFill>
+                  <a:schemeClr val="bg1"/>
+                </a:solidFill>
+                <a:latin typeface="微软雅黑" panose="020B0503020204020204" pitchFamily="34" charset="-122"/>
+                <a:ea typeface="微软雅黑" panose="020B0503020204020204" pitchFamily="34" charset="-122"/>
+              </a:rPr>
+              <a:t>其他回归模型</a:t>
+            </a:r>
+          </a:p>
+        </p:txBody>
+      </p:sp>
+      <p:sp>
+        <p:nvSpPr>
+          <p:cNvPr id="5" name="TextBox 4">
+            <a:extLst>
+              <a:ext uri="{FF2B5EF4-FFF2-40B4-BE49-F238E27FC236}">
+                <a16:creationId xmlns:a16="http://schemas.microsoft.com/office/drawing/2014/main" id="{E8A991AE-3688-4E36-95ED-0003B8B99099}"/>
+              </a:ext>
+            </a:extLst>
+          </p:cNvPr>
+          <p:cNvSpPr txBox="1"/>
+          <p:nvPr/>
+        </p:nvSpPr>
+        <p:spPr>
+          <a:xfrm>
+            <a:off x="323850" y="1628775"/>
             <a:ext cx="8569325" cy="1908215"/>
           </a:xfrm>
           <a:prstGeom prst="rect">
@@ -19418,7 +19781,7 @@
 </p:sld>
 </file>
 
-<file path=ppt/slides/slide16.xml><?xml version="1.0" encoding="utf-8"?>
+<file path=ppt/slides/slide17.xml><?xml version="1.0" encoding="utf-8"?>
 <p:sld xmlns:a="http://schemas.openxmlformats.org/drawingml/2006/main" xmlns:r="http://schemas.openxmlformats.org/officeDocument/2006/relationships" xmlns:p="http://schemas.openxmlformats.org/presentationml/2006/main">
   <p:cSld>
     <p:spTree>
@@ -20174,7 +20537,43 @@
                 </a:solidFill>
                 <a:latin typeface="Arial" charset="0"/>
               </a:rPr>
-              <a:t>f(ax1 + bx2) = </a:t>
+              <a:t>f(ax</a:t>
+            </a:r>
+            <a:r>
+              <a:rPr lang="en-US" altLang="zh-CN" baseline="-25000" dirty="0">
+                <a:solidFill>
+                  <a:schemeClr val="bg1"/>
+                </a:solidFill>
+                <a:latin typeface="Arial" charset="0"/>
+              </a:rPr>
+              <a:t>1</a:t>
+            </a:r>
+            <a:r>
+              <a:rPr lang="en-US" altLang="zh-CN" dirty="0">
+                <a:solidFill>
+                  <a:schemeClr val="bg1"/>
+                </a:solidFill>
+                <a:latin typeface="Arial" charset="0"/>
+              </a:rPr>
+              <a:t> + bx</a:t>
+            </a:r>
+            <a:r>
+              <a:rPr lang="en-US" altLang="zh-CN" baseline="-25000" dirty="0">
+                <a:solidFill>
+                  <a:schemeClr val="bg1"/>
+                </a:solidFill>
+                <a:latin typeface="Arial" charset="0"/>
+              </a:rPr>
+              <a:t>2</a:t>
+            </a:r>
+            <a:r>
+              <a:rPr lang="en-US" altLang="zh-CN" dirty="0">
+                <a:solidFill>
+                  <a:schemeClr val="bg1"/>
+                </a:solidFill>
+                <a:latin typeface="Arial" charset="0"/>
+              </a:rPr>
+              <a:t>) = </a:t>
             </a:r>
             <a:r>
               <a:rPr lang="en-US" altLang="zh-CN" dirty="0" err="1">
@@ -20192,7 +20591,43 @@
                 </a:solidFill>
                 <a:latin typeface="Arial" charset="0"/>
               </a:rPr>
-              <a:t>(x1) + bf(x2)</a:t>
+              <a:t>(x</a:t>
+            </a:r>
+            <a:r>
+              <a:rPr lang="en-US" altLang="zh-CN" baseline="-25000" dirty="0">
+                <a:solidFill>
+                  <a:schemeClr val="bg1"/>
+                </a:solidFill>
+                <a:latin typeface="Arial" charset="0"/>
+              </a:rPr>
+              <a:t>1</a:t>
+            </a:r>
+            <a:r>
+              <a:rPr lang="en-US" altLang="zh-CN" dirty="0">
+                <a:solidFill>
+                  <a:schemeClr val="bg1"/>
+                </a:solidFill>
+                <a:latin typeface="Arial" charset="0"/>
+              </a:rPr>
+              <a:t>) + bf(x</a:t>
+            </a:r>
+            <a:r>
+              <a:rPr lang="en-US" altLang="zh-CN" baseline="-25000" dirty="0">
+                <a:solidFill>
+                  <a:schemeClr val="bg1"/>
+                </a:solidFill>
+                <a:latin typeface="Arial" charset="0"/>
+              </a:rPr>
+              <a:t>2</a:t>
+            </a:r>
+            <a:r>
+              <a:rPr lang="en-US" altLang="zh-CN" dirty="0">
+                <a:solidFill>
+                  <a:schemeClr val="bg1"/>
+                </a:solidFill>
+                <a:latin typeface="Arial" charset="0"/>
+              </a:rPr>
+              <a:t>)</a:t>
             </a:r>
             <a:br>
               <a:rPr lang="zh-CN" altLang="en-US" dirty="0">
@@ -20291,7 +20726,115 @@
                 </a:solidFill>
                 <a:latin typeface="Arial" charset="0"/>
               </a:rPr>
-              <a:t>f(x1+x2)=f(x1)+f(x2)</a:t>
+              <a:t>f(</a:t>
+            </a:r>
+            <a:r>
+              <a:rPr lang="en-US" altLang="zh-CN" dirty="0">
+                <a:solidFill>
+                  <a:schemeClr val="bg1"/>
+                </a:solidFill>
+                <a:latin typeface="Arial" charset="0"/>
+              </a:rPr>
+              <a:t>x</a:t>
+            </a:r>
+            <a:r>
+              <a:rPr lang="en-US" altLang="zh-CN" baseline="-25000" dirty="0">
+                <a:solidFill>
+                  <a:schemeClr val="bg1"/>
+                </a:solidFill>
+                <a:latin typeface="Arial" charset="0"/>
+              </a:rPr>
+              <a:t>1 </a:t>
+            </a:r>
+            <a:r>
+              <a:rPr lang="en-US" dirty="0">
+                <a:solidFill>
+                  <a:schemeClr val="bg1"/>
+                </a:solidFill>
+                <a:latin typeface="Arial" charset="0"/>
+              </a:rPr>
+              <a:t>+</a:t>
+            </a:r>
+            <a:r>
+              <a:rPr lang="en-US" altLang="zh-CN" dirty="0">
+                <a:solidFill>
+                  <a:schemeClr val="bg1"/>
+                </a:solidFill>
+                <a:latin typeface="Arial" charset="0"/>
+              </a:rPr>
+              <a:t>x</a:t>
+            </a:r>
+            <a:r>
+              <a:rPr lang="en-US" altLang="zh-CN" baseline="-25000" dirty="0">
+                <a:solidFill>
+                  <a:schemeClr val="bg1"/>
+                </a:solidFill>
+                <a:latin typeface="Arial" charset="0"/>
+              </a:rPr>
+              <a:t>2</a:t>
+            </a:r>
+            <a:r>
+              <a:rPr lang="en-US" dirty="0">
+                <a:solidFill>
+                  <a:schemeClr val="bg1"/>
+                </a:solidFill>
+                <a:latin typeface="Arial" charset="0"/>
+              </a:rPr>
+              <a:t>)=f(</a:t>
+            </a:r>
+            <a:r>
+              <a:rPr lang="en-US" altLang="zh-CN" dirty="0">
+                <a:solidFill>
+                  <a:schemeClr val="bg1"/>
+                </a:solidFill>
+                <a:latin typeface="Arial" charset="0"/>
+              </a:rPr>
+              <a:t>x</a:t>
+            </a:r>
+            <a:r>
+              <a:rPr lang="en-US" altLang="zh-CN" baseline="-25000" dirty="0">
+                <a:solidFill>
+                  <a:schemeClr val="bg1"/>
+                </a:solidFill>
+                <a:latin typeface="Arial" charset="0"/>
+              </a:rPr>
+              <a:t>1</a:t>
+            </a:r>
+            <a:r>
+              <a:rPr lang="en-US" dirty="0">
+                <a:solidFill>
+                  <a:schemeClr val="bg1"/>
+                </a:solidFill>
+                <a:latin typeface="Arial" charset="0"/>
+              </a:rPr>
+              <a:t>)+f(</a:t>
+            </a:r>
+            <a:r>
+              <a:rPr lang="en-US" altLang="zh-CN" dirty="0">
+                <a:solidFill>
+                  <a:schemeClr val="bg1"/>
+                </a:solidFill>
+                <a:latin typeface="Arial" charset="0"/>
+              </a:rPr>
+              <a:t>x</a:t>
+            </a:r>
+            <a:r>
+              <a:rPr lang="en-US" altLang="zh-CN" baseline="-25000" dirty="0">
+                <a:solidFill>
+                  <a:schemeClr val="bg1"/>
+                </a:solidFill>
+                <a:latin typeface="Arial" charset="0"/>
+              </a:rPr>
+              <a:t>2</a:t>
+            </a:r>
+            <a:r>
+              <a:rPr lang="en-US" dirty="0">
+                <a:solidFill>
+                  <a:schemeClr val="bg1"/>
+                </a:solidFill>
+                <a:latin typeface="Arial" charset="0"/>
+              </a:rPr>
+              <a:t>)</a:t>
             </a:r>
             <a:endParaRPr lang="en-US" altLang="zh-CN" dirty="0">
               <a:solidFill>
@@ -20534,8 +21077,8 @@
           </a:p>
         </p:txBody>
       </p:sp>
-      <mc:AlternateContent xmlns:mc="http://schemas.openxmlformats.org/markup-compatibility/2006" xmlns:a14="http://schemas.microsoft.com/office/drawing/2010/main">
-        <mc:Choice Requires="a14">
+      <mc:AlternateContent xmlns:mc="http://schemas.openxmlformats.org/markup-compatibility/2006">
+        <mc:Choice xmlns:a14="http://schemas.microsoft.com/office/drawing/2010/main" Requires="a14">
           <p:sp>
             <p:nvSpPr>
               <p:cNvPr id="5" name="TextBox 4">
@@ -20599,13 +21142,22 @@
                   </m:oMath>
                 </a14:m>
                 <a:r>
+                  <a:rPr lang="en-US" altLang="zh-CN" sz="2800" baseline="-25000" dirty="0">
+                    <a:solidFill>
+                      <a:schemeClr val="bg1"/>
+                    </a:solidFill>
+                    <a:latin typeface="Arial" charset="0"/>
+                  </a:rPr>
+                  <a:t>0</a:t>
+                </a:r>
+                <a:r>
                   <a:rPr lang="en-US" altLang="zh-CN" sz="2800" dirty="0">
                     <a:solidFill>
                       <a:schemeClr val="bg1"/>
                     </a:solidFill>
                     <a:latin typeface="Arial" charset="0"/>
                   </a:rPr>
-                  <a:t>0 +</a:t>
+                  <a:t> +</a:t>
                 </a:r>
                 <a14:m>
                   <m:oMath xmlns:m="http://schemas.openxmlformats.org/officeDocument/2006/math">
@@ -20621,19 +21173,28 @@
                   </m:oMath>
                 </a14:m>
                 <a:r>
+                  <a:rPr lang="en-US" altLang="zh-CN" sz="2800" baseline="-25000" dirty="0">
+                    <a:solidFill>
+                      <a:schemeClr val="bg1"/>
+                    </a:solidFill>
+                    <a:latin typeface="Arial" charset="0"/>
+                  </a:rPr>
+                  <a:t>1</a:t>
+                </a:r>
+                <a:r>
                   <a:rPr lang="en-US" altLang="zh-CN" sz="2800" dirty="0">
                     <a:solidFill>
                       <a:schemeClr val="bg1"/>
                     </a:solidFill>
                     <a:latin typeface="Arial" charset="0"/>
                   </a:rPr>
-                  <a:t>1x</a:t>
+                  <a:t>x</a:t>
                 </a:r>
               </a:p>
             </p:txBody>
           </p:sp>
         </mc:Choice>
-        <mc:Fallback xmlns="">
+        <mc:Fallback>
           <p:sp>
             <p:nvSpPr>
               <p:cNvPr id="5" name="TextBox 4">
@@ -20678,8 +21239,8 @@
           </p:sp>
         </mc:Fallback>
       </mc:AlternateContent>
-      <mc:AlternateContent xmlns:mc="http://schemas.openxmlformats.org/markup-compatibility/2006" xmlns:a14="http://schemas.microsoft.com/office/drawing/2010/main">
-        <mc:Choice Requires="a14">
+      <mc:AlternateContent xmlns:mc="http://schemas.openxmlformats.org/markup-compatibility/2006">
+        <mc:Choice xmlns:a14="http://schemas.microsoft.com/office/drawing/2010/main" Requires="a14">
           <p:sp>
             <p:nvSpPr>
               <p:cNvPr id="4" name="TextBox 3">
@@ -20880,13 +21441,22 @@
                   </m:oMath>
                 </a14:m>
                 <a:r>
+                  <a:rPr lang="en-US" altLang="zh-CN" baseline="-25000" dirty="0">
+                    <a:solidFill>
+                      <a:schemeClr val="bg1"/>
+                    </a:solidFill>
+                    <a:latin typeface="Arial" charset="0"/>
+                  </a:rPr>
+                  <a:t>0</a:t>
+                </a:r>
+                <a:r>
                   <a:rPr lang="en-US" altLang="zh-CN" dirty="0">
                     <a:solidFill>
                       <a:schemeClr val="bg1"/>
                     </a:solidFill>
                     <a:latin typeface="Arial" charset="0"/>
                   </a:rPr>
-                  <a:t>0</a:t>
+                  <a:t> </a:t>
                 </a:r>
                 <a:r>
                   <a:rPr lang="zh-CN" altLang="en-US" dirty="0">
@@ -20911,7 +21481,7 @@
                   </m:oMath>
                 </a14:m>
                 <a:r>
-                  <a:rPr lang="en-US" altLang="zh-CN" dirty="0">
+                  <a:rPr lang="en-US" altLang="zh-CN" baseline="-25000" dirty="0">
                     <a:solidFill>
                       <a:schemeClr val="bg1"/>
                     </a:solidFill>
@@ -20938,7 +21508,7 @@
             </p:txBody>
           </p:sp>
         </mc:Choice>
-        <mc:Fallback xmlns="">
+        <mc:Fallback>
           <p:sp>
             <p:nvSpPr>
               <p:cNvPr id="4" name="TextBox 3">
@@ -20964,7 +21534,7 @@
               <a:blipFill>
                 <a:blip r:embed="rId4"/>
                 <a:stretch>
-                  <a:fillRect l="-569" t="-4605" r="-213" b="-9868"/>
+                  <a:fillRect l="-569" t="-4605" r="-213" b="-7895"/>
                 </a:stretch>
               </a:blipFill>
             </p:spPr>
@@ -20998,7 +21568,7 @@
           <p:nvPr>
             <p:extLst>
               <p:ext uri="{D42A27DB-BD31-4B8C-83A1-F6EECF244321}">
-                <p14:modId xmlns:p14="http://schemas.microsoft.com/office/powerpoint/2010/main" val="2764593548"/>
+                <p14:modId xmlns:p14="http://schemas.microsoft.com/office/powerpoint/2010/main" val="497517591"/>
               </p:ext>
             </p:extLst>
           </p:nvPr>
@@ -21264,49 +21834,6 @@
           </a:graphicData>
         </a:graphic>
       </p:graphicFrame>
-      <p:sp>
-        <p:nvSpPr>
-          <p:cNvPr id="8" name="TextBox 7">
-            <a:extLst>
-              <a:ext uri="{FF2B5EF4-FFF2-40B4-BE49-F238E27FC236}">
-                <a16:creationId xmlns:a16="http://schemas.microsoft.com/office/drawing/2014/main" id="{4AC59B47-51BC-4FF8-BA1B-0AFEEE670388}"/>
-              </a:ext>
-            </a:extLst>
-          </p:cNvPr>
-          <p:cNvSpPr txBox="1"/>
-          <p:nvPr/>
-        </p:nvSpPr>
-        <p:spPr>
-          <a:xfrm>
-            <a:off x="2915817" y="5253781"/>
-            <a:ext cx="1944216" cy="369332"/>
-          </a:xfrm>
-          <a:prstGeom prst="rect">
-            <a:avLst/>
-          </a:prstGeom>
-          <a:noFill/>
-        </p:spPr>
-        <p:txBody>
-          <a:bodyPr wrap="square">
-            <a:spAutoFit/>
-          </a:bodyPr>
-          <a:lstStyle/>
-          <a:p>
-            <a:pPr>
-              <a:defRPr/>
-            </a:pPr>
-            <a:r>
-              <a:rPr lang="en-US" altLang="zh-CN" dirty="0">
-                <a:solidFill>
-                  <a:schemeClr val="bg1"/>
-                </a:solidFill>
-                <a:latin typeface="Arial" charset="0"/>
-              </a:rPr>
-              <a:t>h(x) = 1 + 3x</a:t>
-            </a:r>
-          </a:p>
-        </p:txBody>
-      </p:sp>
     </p:spTree>
     <p:extLst>
       <p:ext uri="{BB962C8B-B14F-4D97-AF65-F5344CB8AC3E}">
@@ -21509,8 +22036,8 @@
           </a:p>
         </p:txBody>
       </p:sp>
-      <mc:AlternateContent xmlns:mc="http://schemas.openxmlformats.org/markup-compatibility/2006" xmlns:a14="http://schemas.microsoft.com/office/drawing/2010/main">
-        <mc:Choice Requires="a14">
+      <mc:AlternateContent xmlns:mc="http://schemas.openxmlformats.org/markup-compatibility/2006">
+        <mc:Choice xmlns:a14="http://schemas.microsoft.com/office/drawing/2010/main" Requires="a14">
           <p:sp>
             <p:nvSpPr>
               <p:cNvPr id="5" name="TextBox 4">
@@ -21646,13 +22173,22 @@
                   </m:oMath>
                 </a14:m>
                 <a:r>
+                  <a:rPr lang="en-US" altLang="zh-CN" sz="2800" baseline="-25000" dirty="0">
+                    <a:solidFill>
+                      <a:schemeClr val="bg1"/>
+                    </a:solidFill>
+                    <a:latin typeface="Arial" charset="0"/>
+                  </a:rPr>
+                  <a:t>0</a:t>
+                </a:r>
+                <a:r>
                   <a:rPr lang="en-US" altLang="zh-CN" sz="2800" dirty="0">
                     <a:solidFill>
                       <a:schemeClr val="bg1"/>
                     </a:solidFill>
                     <a:latin typeface="Arial" charset="0"/>
                   </a:rPr>
-                  <a:t>0,</a:t>
+                  <a:t>,</a:t>
                 </a:r>
                 <a14:m>
                   <m:oMath xmlns:m="http://schemas.openxmlformats.org/officeDocument/2006/math">
@@ -21668,13 +22204,22 @@
                   </m:oMath>
                 </a14:m>
                 <a:r>
+                  <a:rPr lang="en-US" altLang="zh-CN" sz="2800" baseline="-25000" dirty="0">
+                    <a:solidFill>
+                      <a:schemeClr val="bg1"/>
+                    </a:solidFill>
+                    <a:latin typeface="Arial" charset="0"/>
+                  </a:rPr>
+                  <a:t>1</a:t>
+                </a:r>
+                <a:r>
                   <a:rPr lang="en-US" altLang="zh-CN" sz="2800" dirty="0">
                     <a:solidFill>
                       <a:schemeClr val="bg1"/>
                     </a:solidFill>
                     <a:latin typeface="Arial" charset="0"/>
                   </a:rPr>
-                  <a:t>1) = </a:t>
+                  <a:t>) = </a:t>
                 </a:r>
                 <a14:m>
                   <m:oMath xmlns:m="http://schemas.openxmlformats.org/officeDocument/2006/math">
@@ -21855,7 +22400,7 @@
             </p:txBody>
           </p:sp>
         </mc:Choice>
-        <mc:Fallback xmlns="">
+        <mc:Fallback>
           <p:sp>
             <p:nvSpPr>
               <p:cNvPr id="5" name="TextBox 4">
@@ -21900,8 +22445,8 @@
           </p:sp>
         </mc:Fallback>
       </mc:AlternateContent>
-      <mc:AlternateContent xmlns:mc="http://schemas.openxmlformats.org/markup-compatibility/2006" xmlns:a14="http://schemas.microsoft.com/office/drawing/2010/main">
-        <mc:Choice Requires="a14">
+      <mc:AlternateContent xmlns:mc="http://schemas.openxmlformats.org/markup-compatibility/2006">
+        <mc:Choice xmlns:a14="http://schemas.microsoft.com/office/drawing/2010/main" Requires="a14">
           <p:sp>
             <p:nvSpPr>
               <p:cNvPr id="4" name="TextBox 3">
@@ -21917,7 +22462,7 @@
             <p:spPr>
               <a:xfrm>
                 <a:off x="287334" y="2616532"/>
-                <a:ext cx="8569325" cy="3880999"/>
+                <a:ext cx="8569325" cy="3942554"/>
               </a:xfrm>
               <a:prstGeom prst="rect">
                 <a:avLst/>
@@ -21956,13 +22501,22 @@
                   </m:oMath>
                 </a14:m>
                 <a:r>
+                  <a:rPr lang="en-US" altLang="zh-CN" sz="2400" baseline="-25000" dirty="0">
+                    <a:solidFill>
+                      <a:schemeClr val="bg1"/>
+                    </a:solidFill>
+                    <a:latin typeface="Arial" charset="0"/>
+                  </a:rPr>
+                  <a:t>0</a:t>
+                </a:r>
+                <a:r>
                   <a:rPr lang="en-US" altLang="zh-CN" sz="2400" dirty="0">
                     <a:solidFill>
                       <a:schemeClr val="bg1"/>
                     </a:solidFill>
                     <a:latin typeface="Arial" charset="0"/>
                   </a:rPr>
-                  <a:t>0,</a:t>
+                  <a:t>,</a:t>
                 </a:r>
                 <a14:m>
                   <m:oMath xmlns:m="http://schemas.openxmlformats.org/officeDocument/2006/math">
@@ -21978,7 +22532,7 @@
                   </m:oMath>
                 </a14:m>
                 <a:r>
-                  <a:rPr lang="en-US" altLang="zh-CN" sz="2400" dirty="0">
+                  <a:rPr lang="en-US" altLang="zh-CN" sz="2400" baseline="-25000" dirty="0">
                     <a:solidFill>
                       <a:schemeClr val="bg1"/>
                     </a:solidFill>
@@ -22173,13 +22727,22 @@
                   </m:oMath>
                 </a14:m>
                 <a:r>
+                  <a:rPr lang="en-US" altLang="zh-CN" sz="2400" baseline="-25000" dirty="0">
+                    <a:solidFill>
+                      <a:schemeClr val="bg1"/>
+                    </a:solidFill>
+                    <a:latin typeface="Arial" charset="0"/>
+                  </a:rPr>
+                  <a:t>0 </a:t>
+                </a:r>
+                <a:r>
                   <a:rPr lang="en-US" altLang="zh-CN" sz="2400" dirty="0">
                     <a:solidFill>
                       <a:schemeClr val="bg1"/>
                     </a:solidFill>
                     <a:latin typeface="Arial" charset="0"/>
                   </a:rPr>
-                  <a:t>0 =</a:t>
+                  <a:t>=</a:t>
                 </a:r>
                 <a14:m>
                   <m:oMath xmlns:m="http://schemas.openxmlformats.org/officeDocument/2006/math">
@@ -22195,13 +22758,22 @@
                   </m:oMath>
                 </a14:m>
                 <a:r>
+                  <a:rPr lang="en-US" altLang="zh-CN" sz="2400" baseline="-25000" dirty="0">
+                    <a:solidFill>
+                      <a:schemeClr val="bg1"/>
+                    </a:solidFill>
+                    <a:latin typeface="Arial" charset="0"/>
+                  </a:rPr>
+                  <a:t>0 </a:t>
+                </a:r>
+                <a:r>
                   <a:rPr lang="en-US" altLang="zh-CN" sz="2400" dirty="0">
                     <a:solidFill>
                       <a:schemeClr val="bg1"/>
                     </a:solidFill>
                     <a:latin typeface="Arial" charset="0"/>
                   </a:rPr>
-                  <a:t>0 - </a:t>
+                  <a:t>- </a:t>
                 </a:r>
                 <a14:m>
                   <m:oMath xmlns:m="http://schemas.openxmlformats.org/officeDocument/2006/math">
@@ -22399,17 +22971,17 @@
                       </a:rPr>
                       <m:t>𝜃</m:t>
                     </m:r>
-                    <m:r>
-                      <a:rPr lang="en-US" altLang="zh-CN" sz="2400" b="0" i="0" dirty="0" smtClean="0">
-                        <a:solidFill>
-                          <a:schemeClr val="bg1"/>
-                        </a:solidFill>
-                        <a:latin typeface="Cambria Math" panose="02040503050406030204" pitchFamily="18" charset="0"/>
-                      </a:rPr>
-                      <m:t>1</m:t>
-                    </m:r>
                   </m:oMath>
                 </a14:m>
+                <a:r>
+                  <a:rPr lang="en-US" altLang="zh-CN" sz="2400" baseline="-25000" dirty="0">
+                    <a:solidFill>
+                      <a:schemeClr val="bg1"/>
+                    </a:solidFill>
+                    <a:latin typeface="Arial" charset="0"/>
+                  </a:rPr>
+                  <a:t>1 </a:t>
+                </a:r>
                 <a:r>
                   <a:rPr lang="en-US" altLang="zh-CN" sz="2400" dirty="0">
                     <a:solidFill>
@@ -22417,7 +22989,7 @@
                     </a:solidFill>
                     <a:latin typeface="Arial" charset="0"/>
                   </a:rPr>
-                  <a:t> =</a:t>
+                  <a:t>=</a:t>
                 </a:r>
                 <a14:m>
                   <m:oMath xmlns:m="http://schemas.openxmlformats.org/officeDocument/2006/math">
@@ -22430,17 +23002,17 @@
                       </a:rPr>
                       <m:t>𝜃</m:t>
                     </m:r>
-                    <m:r>
-                      <a:rPr lang="en-US" altLang="zh-CN" sz="2400" b="0" i="0" dirty="0" smtClean="0">
-                        <a:solidFill>
-                          <a:schemeClr val="bg1"/>
-                        </a:solidFill>
-                        <a:latin typeface="Cambria Math" panose="02040503050406030204" pitchFamily="18" charset="0"/>
-                      </a:rPr>
-                      <m:t>1</m:t>
-                    </m:r>
                   </m:oMath>
                 </a14:m>
+                <a:r>
+                  <a:rPr lang="en-US" altLang="zh-CN" sz="2400" baseline="-25000" dirty="0">
+                    <a:solidFill>
+                      <a:schemeClr val="bg1"/>
+                    </a:solidFill>
+                    <a:latin typeface="Arial" charset="0"/>
+                  </a:rPr>
+                  <a:t>1</a:t>
+                </a:r>
                 <a:r>
                   <a:rPr lang="en-US" altLang="zh-CN" sz="2400" dirty="0">
                     <a:solidFill>
@@ -22448,7 +23020,7 @@
                     </a:solidFill>
                     <a:latin typeface="Arial" charset="0"/>
                   </a:rPr>
-                  <a:t> - </a:t>
+                  <a:t>- </a:t>
                 </a:r>
                 <a14:m>
                   <m:oMath xmlns:m="http://schemas.openxmlformats.org/officeDocument/2006/math">
@@ -22805,7 +23377,7 @@
             </p:txBody>
           </p:sp>
         </mc:Choice>
-        <mc:Fallback xmlns="">
+        <mc:Fallback>
           <p:sp>
             <p:nvSpPr>
               <p:cNvPr id="4" name="TextBox 3">
@@ -22823,7 +23395,7 @@
             <p:spPr>
               <a:xfrm>
                 <a:off x="287334" y="2616532"/>
-                <a:ext cx="8569325" cy="3880999"/>
+                <a:ext cx="8569325" cy="3942554"/>
               </a:xfrm>
               <a:prstGeom prst="rect">
                 <a:avLst/>
@@ -22831,7 +23403,7 @@
               <a:blipFill>
                 <a:blip r:embed="rId4"/>
                 <a:stretch>
-                  <a:fillRect l="-1067" t="-1727" b="-2198"/>
+                  <a:fillRect l="-1067" t="-1700" b="-618"/>
                 </a:stretch>
               </a:blipFill>
             </p:spPr>
@@ -23082,8 +23654,8 @@
           </a:p>
         </p:txBody>
       </p:sp>
-      <mc:AlternateContent xmlns:mc="http://schemas.openxmlformats.org/markup-compatibility/2006" xmlns:a14="http://schemas.microsoft.com/office/drawing/2010/main">
-        <mc:Choice Requires="a14">
+      <mc:AlternateContent xmlns:mc="http://schemas.openxmlformats.org/markup-compatibility/2006">
+        <mc:Choice xmlns:a14="http://schemas.microsoft.com/office/drawing/2010/main" Requires="a14">
           <p:sp>
             <p:nvSpPr>
               <p:cNvPr id="5" name="TextBox 4">
@@ -23147,13 +23719,22 @@
                   </m:oMath>
                 </a14:m>
                 <a:r>
+                  <a:rPr lang="en-US" altLang="zh-CN" sz="2800" baseline="-25000" dirty="0">
+                    <a:solidFill>
+                      <a:schemeClr val="bg1"/>
+                    </a:solidFill>
+                    <a:latin typeface="Arial" charset="0"/>
+                  </a:rPr>
+                  <a:t>0 </a:t>
+                </a:r>
+                <a:r>
                   <a:rPr lang="en-US" altLang="zh-CN" sz="2800" dirty="0">
                     <a:solidFill>
                       <a:schemeClr val="bg1"/>
                     </a:solidFill>
                     <a:latin typeface="Arial" charset="0"/>
                   </a:rPr>
-                  <a:t>0+</a:t>
+                  <a:t>+</a:t>
                 </a:r>
                 <a14:m>
                   <m:oMath xmlns:m="http://schemas.openxmlformats.org/officeDocument/2006/math">
@@ -23169,13 +23750,22 @@
                   </m:oMath>
                 </a14:m>
                 <a:r>
+                  <a:rPr lang="en-US" altLang="zh-CN" sz="2800" baseline="-25000" dirty="0">
+                    <a:solidFill>
+                      <a:schemeClr val="bg1"/>
+                    </a:solidFill>
+                    <a:latin typeface="Arial" charset="0"/>
+                  </a:rPr>
+                  <a:t>1 </a:t>
+                </a:r>
+                <a:r>
                   <a:rPr lang="en-US" altLang="zh-CN" sz="2800" dirty="0">
                     <a:solidFill>
                       <a:schemeClr val="bg1"/>
                     </a:solidFill>
                     <a:latin typeface="Arial" charset="0"/>
                   </a:rPr>
-                  <a:t>1x1+</a:t>
+                  <a:t>x1+</a:t>
                 </a:r>
                 <a14:m>
                   <m:oMath xmlns:m="http://schemas.openxmlformats.org/officeDocument/2006/math">
@@ -23188,17 +23778,17 @@
                       </a:rPr>
                       <m:t>𝜃</m:t>
                     </m:r>
-                    <m:r>
-                      <a:rPr lang="en-US" altLang="zh-CN" sz="2800" b="0" i="0" dirty="0" smtClean="0">
-                        <a:solidFill>
-                          <a:schemeClr val="bg1"/>
-                        </a:solidFill>
-                        <a:latin typeface="Cambria Math" panose="02040503050406030204" pitchFamily="18" charset="0"/>
-                      </a:rPr>
-                      <m:t>2</m:t>
-                    </m:r>
                   </m:oMath>
                 </a14:m>
+                <a:r>
+                  <a:rPr lang="en-US" altLang="zh-CN" sz="2800" baseline="-25000" dirty="0">
+                    <a:solidFill>
+                      <a:schemeClr val="bg1"/>
+                    </a:solidFill>
+                    <a:latin typeface="Arial" charset="0"/>
+                  </a:rPr>
+                  <a:t>2</a:t>
+                </a:r>
                 <a:r>
                   <a:rPr lang="en-US" altLang="zh-CN" sz="2800" dirty="0">
                     <a:solidFill>
@@ -23219,17 +23809,17 @@
                       </a:rPr>
                       <m:t>𝜃</m:t>
                     </m:r>
-                    <m:r>
-                      <a:rPr lang="en-US" altLang="zh-CN" sz="2800" b="0" i="1" dirty="0" smtClean="0">
-                        <a:solidFill>
-                          <a:schemeClr val="bg1"/>
-                        </a:solidFill>
-                        <a:latin typeface="Cambria Math" panose="02040503050406030204" pitchFamily="18" charset="0"/>
-                      </a:rPr>
-                      <m:t>𝑛</m:t>
-                    </m:r>
                   </m:oMath>
                 </a14:m>
+                <a:r>
+                  <a:rPr lang="en-US" altLang="zh-CN" sz="2800" baseline="-25000" dirty="0">
+                    <a:solidFill>
+                      <a:schemeClr val="bg1"/>
+                    </a:solidFill>
+                    <a:latin typeface="Arial" charset="0"/>
+                  </a:rPr>
+                  <a:t>n</a:t>
+                </a:r>
                 <a:r>
                   <a:rPr lang="en-US" altLang="zh-CN" sz="2800" dirty="0" err="1">
                     <a:solidFill>
@@ -23290,7 +23880,7 @@
             </p:txBody>
           </p:sp>
         </mc:Choice>
-        <mc:Fallback xmlns="">
+        <mc:Fallback>
           <p:sp>
             <p:nvSpPr>
               <p:cNvPr id="5" name="TextBox 4">
@@ -23335,8 +23925,8 @@
           </p:sp>
         </mc:Fallback>
       </mc:AlternateContent>
-      <mc:AlternateContent xmlns:mc="http://schemas.openxmlformats.org/markup-compatibility/2006" xmlns:a14="http://schemas.microsoft.com/office/drawing/2010/main">
-        <mc:Choice Requires="a14">
+      <mc:AlternateContent xmlns:mc="http://schemas.openxmlformats.org/markup-compatibility/2006">
+        <mc:Choice xmlns:a14="http://schemas.microsoft.com/office/drawing/2010/main" Requires="a14">
           <p:sp>
             <p:nvSpPr>
               <p:cNvPr id="4" name="TextBox 3">
@@ -23742,7 +24332,7 @@
             </p:txBody>
           </p:sp>
         </mc:Choice>
-        <mc:Fallback xmlns="">
+        <mc:Fallback>
           <p:sp>
             <p:nvSpPr>
               <p:cNvPr id="4" name="TextBox 3">
@@ -23787,8 +24377,8 @@
           </p:sp>
         </mc:Fallback>
       </mc:AlternateContent>
-      <mc:AlternateContent xmlns:mc="http://schemas.openxmlformats.org/markup-compatibility/2006" xmlns:a14="http://schemas.microsoft.com/office/drawing/2010/main">
-        <mc:Choice Requires="a14">
+      <mc:AlternateContent xmlns:mc="http://schemas.openxmlformats.org/markup-compatibility/2006">
+        <mc:Choice xmlns:a14="http://schemas.microsoft.com/office/drawing/2010/main" Requires="a14">
           <p:sp>
             <p:nvSpPr>
               <p:cNvPr id="3" name="Rectangle 2">
@@ -24330,17 +24920,17 @@
                       </a:rPr>
                       <m:t>𝜃</m:t>
                     </m:r>
-                    <m:r>
-                      <a:rPr lang="en-US" altLang="zh-CN" b="0" i="1" dirty="0" smtClean="0">
-                        <a:solidFill>
-                          <a:schemeClr val="bg1"/>
-                        </a:solidFill>
-                        <a:latin typeface="Cambria Math" panose="02040503050406030204" pitchFamily="18" charset="0"/>
-                      </a:rPr>
-                      <m:t>𝑗</m:t>
-                    </m:r>
                   </m:oMath>
                 </a14:m>
+                <a:r>
+                  <a:rPr lang="en-US" altLang="zh-CN" baseline="-25000" dirty="0">
+                    <a:solidFill>
+                      <a:schemeClr val="bg1"/>
+                    </a:solidFill>
+                    <a:latin typeface="Arial" charset="0"/>
+                  </a:rPr>
+                  <a:t>j</a:t>
+                </a:r>
                 <a:r>
                   <a:rPr lang="en-US" altLang="zh-CN" dirty="0">
                     <a:solidFill>
@@ -24361,17 +24951,17 @@
                       </a:rPr>
                       <m:t>𝜃</m:t>
                     </m:r>
-                    <m:r>
-                      <a:rPr lang="en-US" altLang="zh-CN" b="0" i="1" dirty="0" smtClean="0">
-                        <a:solidFill>
-                          <a:schemeClr val="bg1"/>
-                        </a:solidFill>
-                        <a:latin typeface="Cambria Math" panose="02040503050406030204" pitchFamily="18" charset="0"/>
-                      </a:rPr>
-                      <m:t>𝑗</m:t>
-                    </m:r>
                   </m:oMath>
                 </a14:m>
+                <a:r>
+                  <a:rPr lang="en-US" altLang="zh-CN" baseline="-25000" dirty="0">
+                    <a:solidFill>
+                      <a:schemeClr val="bg1"/>
+                    </a:solidFill>
+                    <a:latin typeface="Arial" charset="0"/>
+                  </a:rPr>
+                  <a:t>j</a:t>
+                </a:r>
                 <a:r>
                   <a:rPr lang="en-US" altLang="zh-CN" dirty="0">
                     <a:solidFill>
@@ -24379,7 +24969,7 @@
                     </a:solidFill>
                     <a:latin typeface="Arial" charset="0"/>
                   </a:rPr>
-                  <a:t> - </a:t>
+                  <a:t>- </a:t>
                 </a:r>
                 <a14:m>
                   <m:oMath xmlns:m="http://schemas.openxmlformats.org/officeDocument/2006/math">
@@ -24577,7 +25167,7 @@
             </p:txBody>
           </p:sp>
         </mc:Choice>
-        <mc:Fallback xmlns="">
+        <mc:Fallback>
           <p:sp>
             <p:nvSpPr>
               <p:cNvPr id="3" name="Rectangle 2">
@@ -24824,8 +25414,8 @@
           </a:p>
         </p:txBody>
       </p:sp>
-      <mc:AlternateContent xmlns:mc="http://schemas.openxmlformats.org/markup-compatibility/2006" xmlns:a14="http://schemas.microsoft.com/office/drawing/2010/main">
-        <mc:Choice Requires="a14">
+      <mc:AlternateContent xmlns:mc="http://schemas.openxmlformats.org/markup-compatibility/2006">
+        <mc:Choice xmlns:a14="http://schemas.microsoft.com/office/drawing/2010/main" Requires="a14">
           <p:sp>
             <p:nvSpPr>
               <p:cNvPr id="5" name="TextBox 4">
@@ -24901,17 +25491,17 @@
                       </a:rPr>
                       <m:t>𝜃</m:t>
                     </m:r>
-                    <m:r>
-                      <a:rPr lang="en-US" altLang="zh-CN" sz="2800" i="1" dirty="0">
-                        <a:solidFill>
-                          <a:schemeClr val="bg1"/>
-                        </a:solidFill>
-                        <a:latin typeface="Cambria Math" panose="02040503050406030204" pitchFamily="18" charset="0"/>
-                      </a:rPr>
-                      <m:t>𝑗</m:t>
-                    </m:r>
                   </m:oMath>
                 </a14:m>
+                <a:r>
+                  <a:rPr lang="en-US" altLang="zh-CN" sz="2800" baseline="-25000" dirty="0">
+                    <a:solidFill>
+                      <a:schemeClr val="bg1"/>
+                    </a:solidFill>
+                    <a:latin typeface="Arial" charset="0"/>
+                  </a:rPr>
+                  <a:t>j</a:t>
+                </a:r>
                 <a:r>
                   <a:rPr lang="en-US" altLang="zh-CN" sz="2800" dirty="0">
                     <a:solidFill>
@@ -24932,17 +25522,17 @@
                       </a:rPr>
                       <m:t>𝜃</m:t>
                     </m:r>
-                    <m:r>
-                      <a:rPr lang="en-US" altLang="zh-CN" sz="2800" i="1" dirty="0">
-                        <a:solidFill>
-                          <a:schemeClr val="bg1"/>
-                        </a:solidFill>
-                        <a:latin typeface="Cambria Math" panose="02040503050406030204" pitchFamily="18" charset="0"/>
-                      </a:rPr>
-                      <m:t>𝑗</m:t>
-                    </m:r>
                   </m:oMath>
                 </a14:m>
+                <a:r>
+                  <a:rPr lang="en-US" altLang="zh-CN" sz="2800" baseline="-25000" dirty="0">
+                    <a:solidFill>
+                      <a:schemeClr val="bg1"/>
+                    </a:solidFill>
+                    <a:latin typeface="Arial" charset="0"/>
+                  </a:rPr>
+                  <a:t>j</a:t>
+                </a:r>
                 <a:r>
                   <a:rPr lang="en-US" altLang="zh-CN" sz="2800" dirty="0">
                     <a:solidFill>
@@ -25148,7 +25738,7 @@
             </p:txBody>
           </p:sp>
         </mc:Choice>
-        <mc:Fallback xmlns="">
+        <mc:Fallback>
           <p:sp>
             <p:nvSpPr>
               <p:cNvPr id="5" name="TextBox 4">
@@ -25193,8 +25783,8 @@
           </p:sp>
         </mc:Fallback>
       </mc:AlternateContent>
-      <mc:AlternateContent xmlns:mc="http://schemas.openxmlformats.org/markup-compatibility/2006" xmlns:a14="http://schemas.microsoft.com/office/drawing/2010/main">
-        <mc:Choice Requires="a14">
+      <mc:AlternateContent xmlns:mc="http://schemas.openxmlformats.org/markup-compatibility/2006">
+        <mc:Choice xmlns:a14="http://schemas.microsoft.com/office/drawing/2010/main" Requires="a14">
           <p:sp>
             <p:nvSpPr>
               <p:cNvPr id="3" name="Rectangle 2">
@@ -25210,7 +25800,7 @@
             <p:spPr>
               <a:xfrm>
                 <a:off x="287337" y="2852936"/>
-                <a:ext cx="8884099" cy="2308324"/>
+                <a:ext cx="8847294" cy="2308324"/>
               </a:xfrm>
               <a:prstGeom prst="rect">
                 <a:avLst/>
@@ -25335,13 +25925,22 @@
                   </m:oMath>
                 </a14:m>
                 <a:r>
+                  <a:rPr lang="en-US" altLang="zh-CN" baseline="-25000" dirty="0">
+                    <a:solidFill>
+                      <a:schemeClr val="bg1"/>
+                    </a:solidFill>
+                    <a:latin typeface="Arial" charset="0"/>
+                  </a:rPr>
+                  <a:t>0</a:t>
+                </a:r>
+                <a:r>
                   <a:rPr lang="en-US" altLang="zh-CN" dirty="0">
                     <a:solidFill>
                       <a:schemeClr val="bg1"/>
                     </a:solidFill>
                     <a:latin typeface="Arial" charset="0"/>
                   </a:rPr>
-                  <a:t>0=</a:t>
+                  <a:t>=</a:t>
                 </a:r>
                 <a14:m>
                   <m:oMath xmlns:m="http://schemas.openxmlformats.org/officeDocument/2006/math">
@@ -25354,26 +25953,17 @@
                       </a:rPr>
                       <m:t>𝜃</m:t>
                     </m:r>
-                    <m:r>
-                      <a:rPr lang="en-US" altLang="zh-CN" b="0" i="0" dirty="0" smtClean="0">
-                        <a:solidFill>
-                          <a:schemeClr val="bg1"/>
-                        </a:solidFill>
-                        <a:latin typeface="Cambria Math" panose="02040503050406030204" pitchFamily="18" charset="0"/>
-                      </a:rPr>
-                      <m:t>1=</m:t>
-                    </m:r>
-                    <m:r>
-                      <a:rPr lang="zh-CN" altLang="en-US" i="1" dirty="0">
-                        <a:solidFill>
-                          <a:schemeClr val="bg1"/>
-                        </a:solidFill>
-                        <a:latin typeface="Cambria Math" panose="02040503050406030204" pitchFamily="18" charset="0"/>
-                      </a:rPr>
-                      <m:t>𝜃</m:t>
-                    </m:r>
                   </m:oMath>
                 </a14:m>
+                <a:r>
+                  <a:rPr lang="en-US" altLang="zh-CN" baseline="-25000" dirty="0">
+                    <a:solidFill>
+                      <a:schemeClr val="bg1"/>
+                    </a:solidFill>
+                    <a:latin typeface="Arial" charset="0"/>
+                  </a:rPr>
+                  <a:t>1</a:t>
+                </a:r>
                 <a:r>
                   <a:rPr lang="en-US" altLang="zh-CN" dirty="0">
                     <a:solidFill>
@@ -25381,7 +25971,7 @@
                     </a:solidFill>
                     <a:latin typeface="Arial" charset="0"/>
                   </a:rPr>
-                  <a:t>2=…=</a:t>
+                  <a:t>=…=</a:t>
                 </a:r>
                 <a14:m>
                   <m:oMath xmlns:m="http://schemas.openxmlformats.org/officeDocument/2006/math">
@@ -25516,25 +26106,16 @@
                       </a:rPr>
                       <m:t>𝜃</m:t>
                     </m:r>
-                    <m:r>
-                      <a:rPr lang="en-US" altLang="zh-CN" i="1" dirty="0">
-                        <a:solidFill>
-                          <a:schemeClr val="bg1"/>
-                        </a:solidFill>
-                        <a:latin typeface="Cambria Math" panose="02040503050406030204" pitchFamily="18" charset="0"/>
-                      </a:rPr>
-                      <m:t>𝑗</m:t>
-                    </m:r>
                   </m:oMath>
                 </a14:m>
                 <a:r>
-                  <a:rPr lang="en-US" altLang="zh-CN" dirty="0">
+                  <a:rPr lang="en-US" altLang="zh-CN" baseline="-25000" dirty="0">
                     <a:solidFill>
                       <a:schemeClr val="bg1"/>
                     </a:solidFill>
                     <a:latin typeface="Arial" charset="0"/>
                   </a:rPr>
-                  <a:t> </a:t>
+                  <a:t>j</a:t>
                 </a:r>
                 <a:r>
                   <a:rPr lang="zh-CN" altLang="en-US" dirty="0">
@@ -25594,17 +26175,17 @@
                       </a:rPr>
                       <m:t>𝜃</m:t>
                     </m:r>
-                    <m:r>
-                      <a:rPr lang="en-US" altLang="zh-CN" i="1" dirty="0">
-                        <a:solidFill>
-                          <a:schemeClr val="bg1"/>
-                        </a:solidFill>
-                        <a:latin typeface="Cambria Math" panose="02040503050406030204" pitchFamily="18" charset="0"/>
-                      </a:rPr>
-                      <m:t>𝑗</m:t>
-                    </m:r>
                   </m:oMath>
                 </a14:m>
+                <a:r>
+                  <a:rPr lang="en-US" altLang="zh-CN" baseline="-25000" dirty="0">
+                    <a:solidFill>
+                      <a:schemeClr val="bg1"/>
+                    </a:solidFill>
+                    <a:latin typeface="Arial" charset="0"/>
+                  </a:rPr>
+                  <a:t>j</a:t>
+                </a:r>
                 <a:r>
                   <a:rPr lang="en-US" altLang="zh-CN" dirty="0">
                     <a:solidFill>
@@ -25695,7 +26276,7 @@
             </p:txBody>
           </p:sp>
         </mc:Choice>
-        <mc:Fallback xmlns="">
+        <mc:Fallback>
           <p:sp>
             <p:nvSpPr>
               <p:cNvPr id="3" name="Rectangle 2">
@@ -25713,7 +26294,7 @@
             <p:spPr>
               <a:xfrm>
                 <a:off x="287337" y="2852936"/>
-                <a:ext cx="8884099" cy="2308324"/>
+                <a:ext cx="8847294" cy="2308324"/>
               </a:xfrm>
               <a:prstGeom prst="rect">
                 <a:avLst/>
@@ -25721,7 +26302,7 @@
               <a:blipFill>
                 <a:blip r:embed="rId4"/>
                 <a:stretch>
-                  <a:fillRect l="-549" t="-1847"/>
+                  <a:fillRect l="-551" t="-1847"/>
                 </a:stretch>
               </a:blipFill>
             </p:spPr>
@@ -26019,7 +26600,7 @@
         <p:spPr bwMode="auto">
           <a:xfrm>
             <a:off x="179388" y="530225"/>
-            <a:ext cx="6913562" cy="830263"/>
+            <a:ext cx="8065020" cy="830997"/>
           </a:xfrm>
           <a:prstGeom prst="rect">
             <a:avLst/>
@@ -26049,7 +26630,7 @@
           </a:extLst>
         </p:spPr>
         <p:txBody>
-          <a:bodyPr>
+          <a:bodyPr wrap="square">
             <a:spAutoFit/>
           </a:bodyPr>
           <a:lstStyle>
@@ -26169,7 +26750,7 @@
                 <a:latin typeface="微软雅黑" panose="020B0503020204020204" pitchFamily="34" charset="-122"/>
                 <a:ea typeface="微软雅黑" panose="020B0503020204020204" pitchFamily="34" charset="-122"/>
               </a:rPr>
-              <a:t>房价预测示例</a:t>
+              <a:t>线性回归拟合正弦函数示例</a:t>
             </a:r>
           </a:p>
         </p:txBody>
@@ -26189,7 +26770,7 @@
         <p:spPr>
           <a:xfrm>
             <a:off x="251520" y="1556792"/>
-            <a:ext cx="3262432" cy="461665"/>
+            <a:ext cx="2646878" cy="461665"/>
           </a:xfrm>
           <a:prstGeom prst="rect">
             <a:avLst/>
@@ -26211,7 +26792,7 @@
                 </a:solidFill>
                 <a:latin typeface="Arial" charset="0"/>
               </a:rPr>
-              <a:t>房价和哪些因素有关？</a:t>
+              <a:t>线性回归模型评分</a:t>
             </a:r>
             <a:endParaRPr lang="en-US" altLang="zh-CN" sz="2400" dirty="0">
               <a:solidFill>
@@ -26222,38 +26803,663 @@
           </a:p>
         </p:txBody>
       </p:sp>
-      <p:graphicFrame>
-        <p:nvGraphicFramePr>
-          <p:cNvPr id="2" name="Diagram 1">
+      <p:sp>
+        <p:nvSpPr>
+          <p:cNvPr id="6" name="Rectangle 5">
             <a:extLst>
               <a:ext uri="{FF2B5EF4-FFF2-40B4-BE49-F238E27FC236}">
-                <a16:creationId xmlns:a16="http://schemas.microsoft.com/office/drawing/2014/main" id="{E255A650-66CD-41F3-B480-290206010322}"/>
+                <a16:creationId xmlns:a16="http://schemas.microsoft.com/office/drawing/2014/main" id="{526445E2-04B8-42A6-8FA5-5D710AB77449}"/>
               </a:ext>
             </a:extLst>
           </p:cNvPr>
-          <p:cNvGraphicFramePr/>
-          <p:nvPr>
-            <p:extLst>
-              <p:ext uri="{D42A27DB-BD31-4B8C-83A1-F6EECF244321}">
-                <p14:modId xmlns:p14="http://schemas.microsoft.com/office/powerpoint/2010/main" val="2030907437"/>
-              </p:ext>
-            </p:extLst>
-          </p:nvPr>
-        </p:nvGraphicFramePr>
-        <p:xfrm>
-          <a:off x="1524000" y="1841698"/>
-          <a:ext cx="6096000" cy="4064000"/>
-        </p:xfrm>
-        <a:graphic>
-          <a:graphicData uri="http://schemas.openxmlformats.org/drawingml/2006/diagram">
-            <dgm:relIds xmlns:dgm="http://schemas.openxmlformats.org/drawingml/2006/diagram" xmlns:r="http://schemas.openxmlformats.org/officeDocument/2006/relationships" r:dm="rId3" r:lo="rId4" r:qs="rId5" r:cs="rId6"/>
-          </a:graphicData>
-        </a:graphic>
-      </p:graphicFrame>
+          <p:cNvSpPr/>
+          <p:nvPr/>
+        </p:nvSpPr>
+        <p:spPr>
+          <a:xfrm>
+            <a:off x="289062" y="3192453"/>
+            <a:ext cx="7056784" cy="2862322"/>
+          </a:xfrm>
+          <a:prstGeom prst="rect">
+            <a:avLst/>
+          </a:prstGeom>
+        </p:spPr>
+        <p:txBody>
+          <a:bodyPr wrap="square">
+            <a:spAutoFit/>
+          </a:bodyPr>
+          <a:lstStyle/>
+          <a:p>
+            <a:pPr>
+              <a:defRPr/>
+            </a:pPr>
+            <a:r>
+              <a:rPr lang="zh-CN" altLang="en-US" dirty="0">
+                <a:solidFill>
+                  <a:schemeClr val="bg1"/>
+                </a:solidFill>
+                <a:latin typeface="Arial" charset="0"/>
+              </a:rPr>
+              <a:t>决定系数</a:t>
+            </a:r>
+            <a:r>
+              <a:rPr lang="en-US" altLang="zh-CN" dirty="0">
+                <a:solidFill>
+                  <a:schemeClr val="bg1"/>
+                </a:solidFill>
+                <a:latin typeface="Arial" charset="0"/>
+              </a:rPr>
+              <a:t>R^2</a:t>
+            </a:r>
+          </a:p>
+          <a:p>
+            <a:pPr>
+              <a:defRPr/>
+            </a:pPr>
+            <a:endParaRPr lang="en-US" altLang="zh-CN" dirty="0">
+              <a:solidFill>
+                <a:schemeClr val="bg1"/>
+              </a:solidFill>
+              <a:latin typeface="Arial" charset="0"/>
+            </a:endParaRPr>
+          </a:p>
+          <a:p>
+            <a:pPr>
+              <a:defRPr/>
+            </a:pPr>
+            <a:endParaRPr lang="en-US" altLang="zh-CN" dirty="0">
+              <a:solidFill>
+                <a:schemeClr val="bg1"/>
+              </a:solidFill>
+              <a:latin typeface="Arial" charset="0"/>
+            </a:endParaRPr>
+          </a:p>
+          <a:p>
+            <a:pPr marL="285750" indent="-285750">
+              <a:buFont typeface="Arial" panose="020B0604020202020204" pitchFamily="34" charset="0"/>
+              <a:buChar char="•"/>
+              <a:defRPr/>
+            </a:pPr>
+            <a:r>
+              <a:rPr lang="en-US" altLang="zh-CN" dirty="0" err="1">
+                <a:solidFill>
+                  <a:schemeClr val="bg1"/>
+                </a:solidFill>
+                <a:latin typeface="Arial" charset="0"/>
+              </a:rPr>
+              <a:t>SS</a:t>
+            </a:r>
+            <a:r>
+              <a:rPr lang="en-US" altLang="zh-CN" baseline="-25000" dirty="0" err="1">
+                <a:solidFill>
+                  <a:schemeClr val="bg1"/>
+                </a:solidFill>
+                <a:latin typeface="Arial" charset="0"/>
+              </a:rPr>
+              <a:t>res</a:t>
+            </a:r>
+            <a:r>
+              <a:rPr lang="zh-CN" altLang="en-US" dirty="0">
+                <a:solidFill>
+                  <a:schemeClr val="bg1"/>
+                </a:solidFill>
+                <a:latin typeface="Arial" charset="0"/>
+              </a:rPr>
+              <a:t>是预测数据也就是回归数据与平均值的误差</a:t>
+            </a:r>
+            <a:endParaRPr lang="en-US" altLang="zh-CN" dirty="0">
+              <a:solidFill>
+                <a:schemeClr val="bg1"/>
+              </a:solidFill>
+              <a:latin typeface="Arial" charset="0"/>
+            </a:endParaRPr>
+          </a:p>
+          <a:p>
+            <a:pPr marL="285750" indent="-285750">
+              <a:buFont typeface="Arial" panose="020B0604020202020204" pitchFamily="34" charset="0"/>
+              <a:buChar char="•"/>
+              <a:defRPr/>
+            </a:pPr>
+            <a:endParaRPr lang="en-US" altLang="zh-CN" dirty="0">
+              <a:solidFill>
+                <a:schemeClr val="bg1"/>
+              </a:solidFill>
+              <a:latin typeface="Arial" charset="0"/>
+            </a:endParaRPr>
+          </a:p>
+          <a:p>
+            <a:pPr marL="285750" indent="-285750">
+              <a:buFont typeface="Arial" panose="020B0604020202020204" pitchFamily="34" charset="0"/>
+              <a:buChar char="•"/>
+              <a:defRPr/>
+            </a:pPr>
+            <a:r>
+              <a:rPr lang="en-US" altLang="zh-CN" dirty="0" err="1">
+                <a:solidFill>
+                  <a:schemeClr val="bg1"/>
+                </a:solidFill>
+                <a:latin typeface="Arial" charset="0"/>
+              </a:rPr>
+              <a:t>SS</a:t>
+            </a:r>
+            <a:r>
+              <a:rPr lang="en-US" altLang="zh-CN" baseline="-25000" dirty="0" err="1">
+                <a:solidFill>
+                  <a:schemeClr val="bg1"/>
+                </a:solidFill>
+                <a:latin typeface="Arial" charset="0"/>
+              </a:rPr>
+              <a:t>tot</a:t>
+            </a:r>
+            <a:r>
+              <a:rPr lang="zh-CN" altLang="en-US" dirty="0">
+                <a:solidFill>
+                  <a:schemeClr val="bg1"/>
+                </a:solidFill>
+                <a:latin typeface="Arial" charset="0"/>
+              </a:rPr>
+              <a:t>是真实数据与平均值的误差</a:t>
+            </a:r>
+            <a:endParaRPr lang="en-US" altLang="zh-CN" dirty="0">
+              <a:solidFill>
+                <a:schemeClr val="bg1"/>
+              </a:solidFill>
+              <a:latin typeface="Arial" charset="0"/>
+            </a:endParaRPr>
+          </a:p>
+          <a:p>
+            <a:pPr marL="285750" indent="-285750">
+              <a:buFont typeface="Arial" panose="020B0604020202020204" pitchFamily="34" charset="0"/>
+              <a:buChar char="•"/>
+              <a:defRPr/>
+            </a:pPr>
+            <a:endParaRPr lang="en-US" altLang="zh-CN" dirty="0">
+              <a:solidFill>
+                <a:schemeClr val="bg1"/>
+              </a:solidFill>
+              <a:latin typeface="Arial" charset="0"/>
+            </a:endParaRPr>
+          </a:p>
+          <a:p>
+            <a:pPr marL="285750" indent="-285750">
+              <a:buFont typeface="Arial" panose="020B0604020202020204" pitchFamily="34" charset="0"/>
+              <a:buChar char="•"/>
+              <a:defRPr/>
+            </a:pPr>
+            <a:r>
+              <a:rPr lang="en-US" altLang="zh-CN" dirty="0" err="1">
+                <a:solidFill>
+                  <a:schemeClr val="bg1"/>
+                </a:solidFill>
+                <a:latin typeface="Arial" charset="0"/>
+              </a:rPr>
+              <a:t>SS</a:t>
+            </a:r>
+            <a:r>
+              <a:rPr lang="en-US" altLang="zh-CN" baseline="-25000" dirty="0" err="1">
+                <a:solidFill>
+                  <a:schemeClr val="bg1"/>
+                </a:solidFill>
+                <a:latin typeface="Arial" charset="0"/>
+              </a:rPr>
+              <a:t>res</a:t>
+            </a:r>
+            <a:r>
+              <a:rPr lang="en-US" altLang="zh-CN" baseline="-25000" dirty="0">
+                <a:solidFill>
+                  <a:schemeClr val="bg1"/>
+                </a:solidFill>
+                <a:latin typeface="Arial" charset="0"/>
+              </a:rPr>
+              <a:t> </a:t>
+            </a:r>
+            <a:r>
+              <a:rPr lang="zh-CN" altLang="en-US" dirty="0">
+                <a:solidFill>
+                  <a:schemeClr val="bg1"/>
+                </a:solidFill>
+                <a:latin typeface="Arial" charset="0"/>
+              </a:rPr>
+              <a:t>一般比</a:t>
+            </a:r>
+            <a:r>
+              <a:rPr lang="en-US" altLang="zh-CN" dirty="0" err="1">
+                <a:solidFill>
+                  <a:schemeClr val="bg1"/>
+                </a:solidFill>
+                <a:latin typeface="Arial" charset="0"/>
+              </a:rPr>
+              <a:t>SS</a:t>
+            </a:r>
+            <a:r>
+              <a:rPr lang="en-US" altLang="zh-CN" baseline="-25000" dirty="0" err="1">
+                <a:solidFill>
+                  <a:schemeClr val="bg1"/>
+                </a:solidFill>
+                <a:latin typeface="Arial" charset="0"/>
+              </a:rPr>
+              <a:t>tot</a:t>
+            </a:r>
+            <a:r>
+              <a:rPr lang="zh-CN" altLang="en-US" dirty="0">
+                <a:solidFill>
+                  <a:schemeClr val="bg1"/>
+                </a:solidFill>
+                <a:latin typeface="Arial" charset="0"/>
+              </a:rPr>
+              <a:t>小，结果在</a:t>
+            </a:r>
+            <a:r>
+              <a:rPr lang="en-US" altLang="zh-CN" dirty="0">
+                <a:solidFill>
+                  <a:schemeClr val="bg1"/>
+                </a:solidFill>
+                <a:latin typeface="Arial" charset="0"/>
+              </a:rPr>
+              <a:t>0-1</a:t>
+            </a:r>
+            <a:r>
+              <a:rPr lang="zh-CN" altLang="en-US" dirty="0">
+                <a:solidFill>
+                  <a:schemeClr val="bg1"/>
+                </a:solidFill>
+                <a:latin typeface="Arial" charset="0"/>
+              </a:rPr>
+              <a:t>之间。 </a:t>
+            </a:r>
+            <a:r>
+              <a:rPr lang="en-US" altLang="zh-CN" dirty="0" err="1">
+                <a:solidFill>
+                  <a:schemeClr val="bg1"/>
+                </a:solidFill>
+                <a:latin typeface="Arial" charset="0"/>
+              </a:rPr>
+              <a:t>SS</a:t>
+            </a:r>
+            <a:r>
+              <a:rPr lang="en-US" altLang="zh-CN" baseline="-25000" dirty="0" err="1">
+                <a:solidFill>
+                  <a:schemeClr val="bg1"/>
+                </a:solidFill>
+                <a:latin typeface="Arial" charset="0"/>
+              </a:rPr>
+              <a:t>tot</a:t>
+            </a:r>
+            <a:r>
+              <a:rPr lang="zh-CN" altLang="en-US" dirty="0">
+                <a:solidFill>
+                  <a:schemeClr val="bg1"/>
+                </a:solidFill>
+                <a:latin typeface="Arial" charset="0"/>
+              </a:rPr>
+              <a:t>在数据确定后始终是固定值，如果估计的越不准确，那么</a:t>
+            </a:r>
+            <a:r>
+              <a:rPr lang="en-US" altLang="zh-CN" dirty="0" err="1">
+                <a:solidFill>
+                  <a:schemeClr val="bg1"/>
+                </a:solidFill>
+                <a:latin typeface="Arial" charset="0"/>
+              </a:rPr>
+              <a:t>SS</a:t>
+            </a:r>
+            <a:r>
+              <a:rPr lang="en-US" altLang="zh-CN" baseline="-25000" dirty="0" err="1">
+                <a:solidFill>
+                  <a:schemeClr val="bg1"/>
+                </a:solidFill>
+                <a:latin typeface="Arial" charset="0"/>
+              </a:rPr>
+              <a:t>res</a:t>
+            </a:r>
+            <a:r>
+              <a:rPr lang="en-US" altLang="zh-CN" baseline="-25000" dirty="0">
+                <a:solidFill>
+                  <a:schemeClr val="bg1"/>
+                </a:solidFill>
+                <a:latin typeface="Arial" charset="0"/>
+              </a:rPr>
+              <a:t> </a:t>
+            </a:r>
+            <a:r>
+              <a:rPr lang="zh-CN" altLang="en-US" dirty="0">
+                <a:solidFill>
+                  <a:schemeClr val="bg1"/>
+                </a:solidFill>
+                <a:latin typeface="Arial" charset="0"/>
+              </a:rPr>
+              <a:t>就越大，那么</a:t>
+            </a:r>
+            <a:r>
+              <a:rPr lang="en-US" altLang="zh-CN" dirty="0">
+                <a:solidFill>
+                  <a:schemeClr val="bg1"/>
+                </a:solidFill>
+                <a:latin typeface="Arial" charset="0"/>
+              </a:rPr>
+              <a:t>R^2</a:t>
+            </a:r>
+            <a:r>
+              <a:rPr lang="zh-CN" altLang="en-US" dirty="0">
+                <a:solidFill>
+                  <a:schemeClr val="bg1"/>
+                </a:solidFill>
+                <a:latin typeface="Arial" charset="0"/>
+              </a:rPr>
+              <a:t>就越接近</a:t>
+            </a:r>
+            <a:r>
+              <a:rPr lang="en-US" altLang="zh-CN" dirty="0">
+                <a:solidFill>
+                  <a:schemeClr val="bg1"/>
+                </a:solidFill>
+                <a:latin typeface="Arial" charset="0"/>
+              </a:rPr>
+              <a:t>0</a:t>
+            </a:r>
+            <a:r>
+              <a:rPr lang="zh-CN" altLang="en-US" dirty="0">
+                <a:solidFill>
+                  <a:schemeClr val="bg1"/>
+                </a:solidFill>
+                <a:latin typeface="Arial" charset="0"/>
+              </a:rPr>
+              <a:t>，所以预测值也准确就越接近</a:t>
+            </a:r>
+            <a:r>
+              <a:rPr lang="en-US" altLang="zh-CN" dirty="0">
+                <a:solidFill>
+                  <a:schemeClr val="bg1"/>
+                </a:solidFill>
+                <a:latin typeface="Arial" charset="0"/>
+              </a:rPr>
+              <a:t>1</a:t>
+            </a:r>
+          </a:p>
+        </p:txBody>
+      </p:sp>
+      <p:pic>
+        <p:nvPicPr>
+          <p:cNvPr id="13" name="Picture 12">
+            <a:extLst>
+              <a:ext uri="{FF2B5EF4-FFF2-40B4-BE49-F238E27FC236}">
+                <a16:creationId xmlns:a16="http://schemas.microsoft.com/office/drawing/2014/main" id="{E3E025A4-ED8B-4498-ACB9-5809892EC1C9}"/>
+              </a:ext>
+            </a:extLst>
+          </p:cNvPr>
+          <p:cNvPicPr>
+            <a:picLocks noChangeAspect="1"/>
+          </p:cNvPicPr>
+          <p:nvPr/>
+        </p:nvPicPr>
+        <p:blipFill>
+          <a:blip r:embed="rId3"/>
+          <a:stretch>
+            <a:fillRect/>
+          </a:stretch>
+        </p:blipFill>
+        <p:spPr>
+          <a:xfrm>
+            <a:off x="2302483" y="3297895"/>
+            <a:ext cx="1333686" cy="552527"/>
+          </a:xfrm>
+          <a:prstGeom prst="rect">
+            <a:avLst/>
+          </a:prstGeom>
+        </p:spPr>
+      </p:pic>
+      <p:sp>
+        <p:nvSpPr>
+          <p:cNvPr id="14" name="Rectangle 8">
+            <a:extLst>
+              <a:ext uri="{FF2B5EF4-FFF2-40B4-BE49-F238E27FC236}">
+                <a16:creationId xmlns:a16="http://schemas.microsoft.com/office/drawing/2014/main" id="{F9F08CB5-7E33-453D-8B17-36D1609B37AE}"/>
+              </a:ext>
+            </a:extLst>
+          </p:cNvPr>
+          <p:cNvSpPr>
+            <a:spLocks noChangeArrowheads="1"/>
+          </p:cNvSpPr>
+          <p:nvPr/>
+        </p:nvSpPr>
+        <p:spPr bwMode="auto">
+          <a:xfrm>
+            <a:off x="0" y="0"/>
+            <a:ext cx="9144000" cy="0"/>
+          </a:xfrm>
+          <a:prstGeom prst="rect">
+            <a:avLst/>
+          </a:prstGeom>
+          <a:noFill/>
+          <a:ln>
+            <a:noFill/>
+          </a:ln>
+          <a:effectLst/>
+          <a:extLst>
+            <a:ext uri="{909E8E84-426E-40DD-AFC4-6F175D3DCCD1}">
+              <a14:hiddenFill xmlns:a14="http://schemas.microsoft.com/office/drawing/2010/main">
+                <a:solidFill>
+                  <a:schemeClr val="accent1"/>
+                </a:solidFill>
+              </a14:hiddenFill>
+            </a:ext>
+            <a:ext uri="{91240B29-F687-4F45-9708-019B960494DF}">
+              <a14:hiddenLine xmlns:a14="http://schemas.microsoft.com/office/drawing/2010/main" w="9525">
+                <a:solidFill>
+                  <a:schemeClr val="tx1"/>
+                </a:solidFill>
+                <a:miter lim="800000"/>
+                <a:headEnd/>
+                <a:tailEnd/>
+              </a14:hiddenLine>
+            </a:ext>
+            <a:ext uri="{AF507438-7753-43E0-B8FC-AC1667EBCBE1}">
+              <a14:hiddenEffects xmlns:a14="http://schemas.microsoft.com/office/drawing/2010/main">
+                <a:effectLst>
+                  <a:outerShdw dist="35921" dir="2700000" algn="ctr" rotWithShape="0">
+                    <a:schemeClr val="bg2"/>
+                  </a:outerShdw>
+                </a:effectLst>
+              </a14:hiddenEffects>
+            </a:ext>
+          </a:extLst>
+        </p:spPr>
+        <p:txBody>
+          <a:bodyPr vert="horz" wrap="none" lIns="91440" tIns="45720" rIns="91440" bIns="45720" numCol="1" anchor="ctr" anchorCtr="0" compatLnSpc="1">
+            <a:prstTxWarp prst="textNoShape">
+              <a:avLst/>
+            </a:prstTxWarp>
+            <a:spAutoFit/>
+          </a:bodyPr>
+          <a:lstStyle>
+            <a:lvl1pPr eaLnBrk="0" hangingPunct="0">
+              <a:defRPr>
+                <a:solidFill>
+                  <a:schemeClr val="tx1"/>
+                </a:solidFill>
+                <a:latin typeface="Arial" panose="020B0604020202020204" pitchFamily="34" charset="0"/>
+              </a:defRPr>
+            </a:lvl1pPr>
+            <a:lvl2pPr eaLnBrk="0" hangingPunct="0">
+              <a:defRPr>
+                <a:solidFill>
+                  <a:schemeClr val="tx1"/>
+                </a:solidFill>
+                <a:latin typeface="Arial" panose="020B0604020202020204" pitchFamily="34" charset="0"/>
+              </a:defRPr>
+            </a:lvl2pPr>
+            <a:lvl3pPr eaLnBrk="0" hangingPunct="0">
+              <a:defRPr>
+                <a:solidFill>
+                  <a:schemeClr val="tx1"/>
+                </a:solidFill>
+                <a:latin typeface="Arial" panose="020B0604020202020204" pitchFamily="34" charset="0"/>
+              </a:defRPr>
+            </a:lvl3pPr>
+            <a:lvl4pPr eaLnBrk="0" hangingPunct="0">
+              <a:defRPr>
+                <a:solidFill>
+                  <a:schemeClr val="tx1"/>
+                </a:solidFill>
+                <a:latin typeface="Arial" panose="020B0604020202020204" pitchFamily="34" charset="0"/>
+              </a:defRPr>
+            </a:lvl4pPr>
+            <a:lvl5pPr eaLnBrk="0" hangingPunct="0">
+              <a:defRPr>
+                <a:solidFill>
+                  <a:schemeClr val="tx1"/>
+                </a:solidFill>
+                <a:latin typeface="Arial" panose="020B0604020202020204" pitchFamily="34" charset="0"/>
+              </a:defRPr>
+            </a:lvl5pPr>
+            <a:lvl6pPr eaLnBrk="0" fontAlgn="base" hangingPunct="0">
+              <a:spcBef>
+                <a:spcPct val="0"/>
+              </a:spcBef>
+              <a:spcAft>
+                <a:spcPct val="0"/>
+              </a:spcAft>
+              <a:defRPr>
+                <a:solidFill>
+                  <a:schemeClr val="tx1"/>
+                </a:solidFill>
+                <a:latin typeface="Arial" panose="020B0604020202020204" pitchFamily="34" charset="0"/>
+              </a:defRPr>
+            </a:lvl6pPr>
+            <a:lvl7pPr eaLnBrk="0" fontAlgn="base" hangingPunct="0">
+              <a:spcBef>
+                <a:spcPct val="0"/>
+              </a:spcBef>
+              <a:spcAft>
+                <a:spcPct val="0"/>
+              </a:spcAft>
+              <a:defRPr>
+                <a:solidFill>
+                  <a:schemeClr val="tx1"/>
+                </a:solidFill>
+                <a:latin typeface="Arial" panose="020B0604020202020204" pitchFamily="34" charset="0"/>
+              </a:defRPr>
+            </a:lvl7pPr>
+            <a:lvl8pPr eaLnBrk="0" fontAlgn="base" hangingPunct="0">
+              <a:spcBef>
+                <a:spcPct val="0"/>
+              </a:spcBef>
+              <a:spcAft>
+                <a:spcPct val="0"/>
+              </a:spcAft>
+              <a:defRPr>
+                <a:solidFill>
+                  <a:schemeClr val="tx1"/>
+                </a:solidFill>
+                <a:latin typeface="Arial" panose="020B0604020202020204" pitchFamily="34" charset="0"/>
+              </a:defRPr>
+            </a:lvl8pPr>
+            <a:lvl9pPr eaLnBrk="0" fontAlgn="base" hangingPunct="0">
+              <a:spcBef>
+                <a:spcPct val="0"/>
+              </a:spcBef>
+              <a:spcAft>
+                <a:spcPct val="0"/>
+              </a:spcAft>
+              <a:defRPr>
+                <a:solidFill>
+                  <a:schemeClr val="tx1"/>
+                </a:solidFill>
+                <a:latin typeface="Arial" panose="020B0604020202020204" pitchFamily="34" charset="0"/>
+              </a:defRPr>
+            </a:lvl9pPr>
+          </a:lstStyle>
+          <a:p>
+            <a:pPr marL="0" marR="0" lvl="0" indent="0" algn="l" defTabSz="914400" rtl="0" eaLnBrk="0" fontAlgn="base" latinLnBrk="0" hangingPunct="0">
+              <a:lnSpc>
+                <a:spcPct val="100000"/>
+              </a:lnSpc>
+              <a:spcBef>
+                <a:spcPct val="0"/>
+              </a:spcBef>
+              <a:spcAft>
+                <a:spcPct val="0"/>
+              </a:spcAft>
+              <a:buClrTx/>
+              <a:buSzTx/>
+              <a:buFontTx/>
+              <a:buNone/>
+              <a:tabLst/>
+            </a:pPr>
+            <a:r>
+              <a:rPr kumimoji="0" lang="en-US" altLang="en-US" sz="1000" b="0" i="0" u="none" strike="noStrike" cap="none" normalizeH="0" baseline="0">
+                <a:ln>
+                  <a:noFill/>
+                </a:ln>
+                <a:solidFill>
+                  <a:srgbClr val="333333"/>
+                </a:solidFill>
+                <a:effectLst/>
+                <a:latin typeface="Arial" panose="020B0604020202020204" pitchFamily="34" charset="0"/>
+                <a:ea typeface="-apple-system"/>
+              </a:rPr>
+              <a:t>那么</a:t>
+            </a:r>
+            <a:br>
+              <a:rPr kumimoji="0" lang="en-US" altLang="en-US" sz="1200" b="0" i="0" u="none" strike="noStrike" cap="none" normalizeH="0" baseline="0">
+                <a:ln>
+                  <a:noFill/>
+                </a:ln>
+                <a:solidFill>
+                  <a:srgbClr val="333333"/>
+                </a:solidFill>
+                <a:effectLst/>
+                <a:latin typeface="Arial" panose="020B0604020202020204" pitchFamily="34" charset="0"/>
+                <a:ea typeface="-apple-system"/>
+              </a:rPr>
+            </a:br>
+            <a:endParaRPr kumimoji="0" lang="en-US" altLang="en-US" sz="1800" b="0" i="0" u="none" strike="noStrike" cap="none" normalizeH="0" baseline="0">
+              <a:ln>
+                <a:noFill/>
+              </a:ln>
+              <a:solidFill>
+                <a:schemeClr val="tx1"/>
+              </a:solidFill>
+              <a:effectLst/>
+              <a:latin typeface="Arial" panose="020B0604020202020204" pitchFamily="34" charset="0"/>
+            </a:endParaRPr>
+          </a:p>
+        </p:txBody>
+      </p:sp>
+      <p:pic>
+        <p:nvPicPr>
+          <p:cNvPr id="15" name="Picture 14">
+            <a:extLst>
+              <a:ext uri="{FF2B5EF4-FFF2-40B4-BE49-F238E27FC236}">
+                <a16:creationId xmlns:a16="http://schemas.microsoft.com/office/drawing/2014/main" id="{ADD612D9-27D3-4661-9E45-BE9E9CFBD9FE}"/>
+              </a:ext>
+            </a:extLst>
+          </p:cNvPr>
+          <p:cNvPicPr>
+            <a:picLocks noChangeAspect="1"/>
+          </p:cNvPicPr>
+          <p:nvPr/>
+        </p:nvPicPr>
+        <p:blipFill>
+          <a:blip r:embed="rId4"/>
+          <a:stretch>
+            <a:fillRect/>
+          </a:stretch>
+        </p:blipFill>
+        <p:spPr>
+          <a:xfrm>
+            <a:off x="3990745" y="1646856"/>
+            <a:ext cx="4901735" cy="1771004"/>
+          </a:xfrm>
+          <a:prstGeom prst="rect">
+            <a:avLst/>
+          </a:prstGeom>
+        </p:spPr>
+      </p:pic>
     </p:spTree>
     <p:extLst>
       <p:ext uri="{BB962C8B-B14F-4D97-AF65-F5344CB8AC3E}">
-        <p14:creationId xmlns:p14="http://schemas.microsoft.com/office/powerpoint/2010/main" val="4196043933"/>
+        <p14:creationId xmlns:p14="http://schemas.microsoft.com/office/powerpoint/2010/main" val="1226828082"/>
       </p:ext>
     </p:extLst>
   </p:cSld>

</xml_diff>